<commit_message>
Canonical view and bank task
</commit_message>
<xml_diff>
--- a/Lab2-Simplex/lab2.pptx
+++ b/Lab2-Simplex/lab2.pptx
@@ -6,10 +6,10 @@
     <p:sldMasterId id="2147483698" r:id="rId2"/>
   </p:sldMasterIdLst>
   <p:notesMasterIdLst>
-    <p:notesMasterId r:id="rId11"/>
+    <p:notesMasterId r:id="rId12"/>
   </p:notesMasterIdLst>
   <p:handoutMasterIdLst>
-    <p:handoutMasterId r:id="rId12"/>
+    <p:handoutMasterId r:id="rId13"/>
   </p:handoutMasterIdLst>
   <p:sldIdLst>
     <p:sldId id="265" r:id="rId3"/>
@@ -19,7 +19,8 @@
     <p:sldId id="344" r:id="rId7"/>
     <p:sldId id="341" r:id="rId8"/>
     <p:sldId id="345" r:id="rId9"/>
-    <p:sldId id="342" r:id="rId10"/>
+    <p:sldId id="346" r:id="rId10"/>
+    <p:sldId id="342" r:id="rId11"/>
   </p:sldIdLst>
   <p:sldSz cx="9144000" cy="5143500" type="screen16x9"/>
   <p:notesSz cx="6858000" cy="9144000"/>
@@ -220,7 +221,7 @@
             <a:fld id="{19412975-4CFD-C441-A244-B7FD9A9579C2}" type="datetimeFigureOut">
               <a:rPr lang="en-US" smtClean="0"/>
               <a:pPr/>
-              <a:t>10/18/2021</a:t>
+              <a:t>10/22/2021</a:t>
             </a:fld>
             <a:endParaRPr lang="en-US"/>
           </a:p>
@@ -388,7 +389,7 @@
             <a:fld id="{6DAFD1C8-470D-774F-8B40-381C3059BD4A}" type="datetimeFigureOut">
               <a:rPr lang="en-US" smtClean="0"/>
               <a:pPr/>
-              <a:t>10/18/2021</a:t>
+              <a:t>10/22/2021</a:t>
             </a:fld>
             <a:endParaRPr lang="en-US"/>
           </a:p>
@@ -1343,6 +1344,93 @@
     </p:spTree>
     <p:extLst>
       <p:ext uri="{BB962C8B-B14F-4D97-AF65-F5344CB8AC3E}">
+        <p14:creationId xmlns:p14="http://schemas.microsoft.com/office/powerpoint/2010/main" val="805158298"/>
+      </p:ext>
+    </p:extLst>
+  </p:cSld>
+  <p:clrMapOvr>
+    <a:masterClrMapping/>
+  </p:clrMapOvr>
+</p:notes>
+</file>
+
+<file path=ppt/notesSlides/notesSlide9.xml><?xml version="1.0" encoding="utf-8"?>
+<p:notes xmlns:a="http://schemas.openxmlformats.org/drawingml/2006/main" xmlns:r="http://schemas.openxmlformats.org/officeDocument/2006/relationships" xmlns:p="http://schemas.openxmlformats.org/presentationml/2006/main">
+  <p:cSld>
+    <p:spTree>
+      <p:nvGrpSpPr>
+        <p:cNvPr id="1" name=""/>
+        <p:cNvGrpSpPr/>
+        <p:nvPr/>
+      </p:nvGrpSpPr>
+      <p:grpSpPr>
+        <a:xfrm>
+          <a:off x="0" y="0"/>
+          <a:ext cx="0" cy="0"/>
+          <a:chOff x="0" y="0"/>
+          <a:chExt cx="0" cy="0"/>
+        </a:xfrm>
+      </p:grpSpPr>
+      <p:sp>
+        <p:nvSpPr>
+          <p:cNvPr id="2" name="Образ слайда 1"/>
+          <p:cNvSpPr>
+            <a:spLocks noGrp="1" noRot="1" noChangeAspect="1"/>
+          </p:cNvSpPr>
+          <p:nvPr>
+            <p:ph type="sldImg"/>
+          </p:nvPr>
+        </p:nvSpPr>
+        <p:spPr/>
+      </p:sp>
+      <p:sp>
+        <p:nvSpPr>
+          <p:cNvPr id="3" name="Заметки 2"/>
+          <p:cNvSpPr>
+            <a:spLocks noGrp="1"/>
+          </p:cNvSpPr>
+          <p:nvPr>
+            <p:ph type="body" idx="1"/>
+          </p:nvPr>
+        </p:nvSpPr>
+        <p:spPr/>
+        <p:txBody>
+          <a:bodyPr/>
+          <a:lstStyle/>
+          <a:p>
+            <a:endParaRPr lang="ru-RU" dirty="0">
+              <a:effectLst/>
+            </a:endParaRPr>
+          </a:p>
+        </p:txBody>
+      </p:sp>
+      <p:sp>
+        <p:nvSpPr>
+          <p:cNvPr id="4" name="Номер слайда 3"/>
+          <p:cNvSpPr>
+            <a:spLocks noGrp="1"/>
+          </p:cNvSpPr>
+          <p:nvPr>
+            <p:ph type="sldNum" sz="quarter" idx="10"/>
+          </p:nvPr>
+        </p:nvSpPr>
+        <p:spPr/>
+        <p:txBody>
+          <a:bodyPr/>
+          <a:lstStyle/>
+          <a:p>
+            <a:fld id="{F449711C-DB87-6342-8123-FE7E39EB0067}" type="slidenum">
+              <a:rPr lang="en-US" smtClean="0"/>
+              <a:pPr/>
+              <a:t>9</a:t>
+            </a:fld>
+            <a:endParaRPr lang="en-US"/>
+          </a:p>
+        </p:txBody>
+      </p:sp>
+    </p:spTree>
+    <p:extLst>
+      <p:ext uri="{BB962C8B-B14F-4D97-AF65-F5344CB8AC3E}">
         <p14:creationId xmlns:p14="http://schemas.microsoft.com/office/powerpoint/2010/main" val="4141916666"/>
       </p:ext>
     </p:extLst>
@@ -1546,7 +1634,7 @@
           <p:cNvPr id="2" name="TextBox 1">
             <a:extLst>
               <a:ext uri="{FF2B5EF4-FFF2-40B4-BE49-F238E27FC236}">
-                <a16:creationId xmlns:a16="http://schemas.microsoft.com/office/drawing/2014/main" xmlns="" id="{BA7C2B0B-B320-420D-A967-DC1BDF58D8C9}"/>
+                <a16:creationId xmlns="" xmlns:a16="http://schemas.microsoft.com/office/drawing/2014/main" id="{BA7C2B0B-B320-420D-A967-DC1BDF58D8C9}"/>
               </a:ext>
             </a:extLst>
           </p:cNvPr>
@@ -2732,7 +2820,7 @@
           <p:cNvPr id="9" name="TextBox 8">
             <a:extLst>
               <a:ext uri="{FF2B5EF4-FFF2-40B4-BE49-F238E27FC236}">
-                <a16:creationId xmlns:a16="http://schemas.microsoft.com/office/drawing/2014/main" xmlns="" id="{D3C9913D-E691-4C0E-A54B-31C88DB98B60}"/>
+                <a16:creationId xmlns="" xmlns:a16="http://schemas.microsoft.com/office/drawing/2014/main" id="{D3C9913D-E691-4C0E-A54B-31C88DB98B60}"/>
               </a:ext>
             </a:extLst>
           </p:cNvPr>
@@ -2891,7 +2979,7 @@
           <p:cNvPr id="4" name="TextBox 3">
             <a:extLst>
               <a:ext uri="{FF2B5EF4-FFF2-40B4-BE49-F238E27FC236}">
-                <a16:creationId xmlns:a16="http://schemas.microsoft.com/office/drawing/2014/main" xmlns="" id="{29D227C4-5DF1-41BB-B306-3AA13E793F1F}"/>
+                <a16:creationId xmlns="" xmlns:a16="http://schemas.microsoft.com/office/drawing/2014/main" id="{29D227C4-5DF1-41BB-B306-3AA13E793F1F}"/>
               </a:ext>
             </a:extLst>
           </p:cNvPr>
@@ -3025,7 +3113,7 @@
           <p:cNvPr id="4" name="TextBox 3">
             <a:extLst>
               <a:ext uri="{FF2B5EF4-FFF2-40B4-BE49-F238E27FC236}">
-                <a16:creationId xmlns:a16="http://schemas.microsoft.com/office/drawing/2014/main" xmlns="" id="{A9287AEE-7C15-4CC6-8F28-601B937ECC42}"/>
+                <a16:creationId xmlns="" xmlns:a16="http://schemas.microsoft.com/office/drawing/2014/main" id="{A9287AEE-7C15-4CC6-8F28-601B937ECC42}"/>
               </a:ext>
             </a:extLst>
           </p:cNvPr>
@@ -3206,7 +3294,7 @@
           <p:cNvPr id="4" name="TextBox 3">
             <a:extLst>
               <a:ext uri="{FF2B5EF4-FFF2-40B4-BE49-F238E27FC236}">
-                <a16:creationId xmlns:a16="http://schemas.microsoft.com/office/drawing/2014/main" xmlns="" id="{CFAD2831-BBBF-423D-9A68-85A85F7B200E}"/>
+                <a16:creationId xmlns="" xmlns:a16="http://schemas.microsoft.com/office/drawing/2014/main" id="{CFAD2831-BBBF-423D-9A68-85A85F7B200E}"/>
               </a:ext>
             </a:extLst>
           </p:cNvPr>
@@ -5421,7 +5509,7 @@
           <p:cNvPr id="6" name="Title 4">
             <a:extLst>
               <a:ext uri="{FF2B5EF4-FFF2-40B4-BE49-F238E27FC236}">
-                <a16:creationId xmlns:a16="http://schemas.microsoft.com/office/drawing/2014/main" xmlns="" id="{DB3548E4-C03B-4539-943F-4D34B51D909F}"/>
+                <a16:creationId xmlns="" xmlns:a16="http://schemas.microsoft.com/office/drawing/2014/main" id="{DB3548E4-C03B-4539-943F-4D34B51D909F}"/>
               </a:ext>
             </a:extLst>
           </p:cNvPr>
@@ -5497,7 +5585,7 @@
           <p:cNvPr id="4" name="Title 1">
             <a:extLst>
               <a:ext uri="{FF2B5EF4-FFF2-40B4-BE49-F238E27FC236}">
-                <a16:creationId xmlns:a16="http://schemas.microsoft.com/office/drawing/2014/main" xmlns="" id="{3E22FEA6-438B-4395-A553-98801890D475}"/>
+                <a16:creationId xmlns="" xmlns:a16="http://schemas.microsoft.com/office/drawing/2014/main" id="{3E22FEA6-438B-4395-A553-98801890D475}"/>
               </a:ext>
             </a:extLst>
           </p:cNvPr>
@@ -5562,7 +5650,7 @@
           <p:cNvPr id="3" name="Заголовок 2">
             <a:extLst>
               <a:ext uri="{FF2B5EF4-FFF2-40B4-BE49-F238E27FC236}">
-                <a16:creationId xmlns:a16="http://schemas.microsoft.com/office/drawing/2014/main" xmlns="" id="{19A8DA81-38E7-4A3F-870F-67D074D860E6}"/>
+                <a16:creationId xmlns="" xmlns:a16="http://schemas.microsoft.com/office/drawing/2014/main" id="{19A8DA81-38E7-4A3F-870F-67D074D860E6}"/>
               </a:ext>
             </a:extLst>
           </p:cNvPr>
@@ -5607,7 +5695,7 @@
           <p:cNvPr id="7" name="Заголовок 2">
             <a:extLst>
               <a:ext uri="{FF2B5EF4-FFF2-40B4-BE49-F238E27FC236}">
-                <a16:creationId xmlns:a16="http://schemas.microsoft.com/office/drawing/2014/main" xmlns="" id="{A2CB20CA-B80A-42E8-866D-814514A6A27F}"/>
+                <a16:creationId xmlns="" xmlns:a16="http://schemas.microsoft.com/office/drawing/2014/main" id="{A2CB20CA-B80A-42E8-866D-814514A6A27F}"/>
               </a:ext>
             </a:extLst>
           </p:cNvPr>
@@ -5684,7 +5772,7 @@
           <p:cNvPr id="9" name="Заголовок 2">
             <a:extLst>
               <a:ext uri="{FF2B5EF4-FFF2-40B4-BE49-F238E27FC236}">
-                <a16:creationId xmlns:a16="http://schemas.microsoft.com/office/drawing/2014/main" xmlns="" id="{79C9A0F9-C6A9-490A-BC60-D50605F41327}"/>
+                <a16:creationId xmlns="" xmlns:a16="http://schemas.microsoft.com/office/drawing/2014/main" id="{79C9A0F9-C6A9-490A-BC60-D50605F41327}"/>
               </a:ext>
             </a:extLst>
           </p:cNvPr>
@@ -5761,7 +5849,7 @@
           <p:cNvPr id="8" name="TextBox 7">
             <a:extLst>
               <a:ext uri="{FF2B5EF4-FFF2-40B4-BE49-F238E27FC236}">
-                <a16:creationId xmlns:a16="http://schemas.microsoft.com/office/drawing/2014/main" xmlns="" id="{8B5523EB-5418-4A6F-B4FE-0044261F18A3}"/>
+                <a16:creationId xmlns="" xmlns:a16="http://schemas.microsoft.com/office/drawing/2014/main" id="{8B5523EB-5418-4A6F-B4FE-0044261F18A3}"/>
               </a:ext>
             </a:extLst>
           </p:cNvPr>
@@ -5867,7 +5955,7 @@
           <p:cNvPr id="6" name="Title 1">
             <a:extLst>
               <a:ext uri="{FF2B5EF4-FFF2-40B4-BE49-F238E27FC236}">
-                <a16:creationId xmlns:a16="http://schemas.microsoft.com/office/drawing/2014/main" xmlns="" id="{290FAFEE-B028-44A8-8F57-9D774A87E2B5}"/>
+                <a16:creationId xmlns="" xmlns:a16="http://schemas.microsoft.com/office/drawing/2014/main" id="{290FAFEE-B028-44A8-8F57-9D774A87E2B5}"/>
               </a:ext>
             </a:extLst>
           </p:cNvPr>
@@ -5911,7 +5999,7 @@
           <p:cNvPr id="2" name="Content Placeholder 2">
             <a:extLst>
               <a:ext uri="{FF2B5EF4-FFF2-40B4-BE49-F238E27FC236}">
-                <a16:creationId xmlns:a16="http://schemas.microsoft.com/office/drawing/2014/main" xmlns="" id="{48A973AF-57A9-4C50-9A15-F4BD40663BD0}"/>
+                <a16:creationId xmlns="" xmlns:a16="http://schemas.microsoft.com/office/drawing/2014/main" id="{48A973AF-57A9-4C50-9A15-F4BD40663BD0}"/>
               </a:ext>
             </a:extLst>
           </p:cNvPr>
@@ -6111,7 +6199,7 @@
           <p:cNvPr id="8" name="Title 1">
             <a:extLst>
               <a:ext uri="{FF2B5EF4-FFF2-40B4-BE49-F238E27FC236}">
-                <a16:creationId xmlns:a16="http://schemas.microsoft.com/office/drawing/2014/main" xmlns="" id="{C24F04B9-E03C-4B72-8BC4-E5E800850209}"/>
+                <a16:creationId xmlns="" xmlns:a16="http://schemas.microsoft.com/office/drawing/2014/main" id="{C24F04B9-E03C-4B72-8BC4-E5E800850209}"/>
               </a:ext>
             </a:extLst>
           </p:cNvPr>
@@ -6171,7 +6259,7 @@
           <p:cNvPr id="10" name="Title 1">
             <a:extLst>
               <a:ext uri="{FF2B5EF4-FFF2-40B4-BE49-F238E27FC236}">
-                <a16:creationId xmlns:a16="http://schemas.microsoft.com/office/drawing/2014/main" xmlns="" id="{362EDAD4-6AE3-487B-B5BD-D6467CCCDC45}"/>
+                <a16:creationId xmlns="" xmlns:a16="http://schemas.microsoft.com/office/drawing/2014/main" id="{362EDAD4-6AE3-487B-B5BD-D6467CCCDC45}"/>
               </a:ext>
             </a:extLst>
           </p:cNvPr>
@@ -6292,7 +6380,7 @@
           <p:cNvPr id="6" name="Title 1">
             <a:extLst>
               <a:ext uri="{FF2B5EF4-FFF2-40B4-BE49-F238E27FC236}">
-                <a16:creationId xmlns:a16="http://schemas.microsoft.com/office/drawing/2014/main" xmlns="" id="{290FAFEE-B028-44A8-8F57-9D774A87E2B5}"/>
+                <a16:creationId xmlns="" xmlns:a16="http://schemas.microsoft.com/office/drawing/2014/main" id="{290FAFEE-B028-44A8-8F57-9D774A87E2B5}"/>
               </a:ext>
             </a:extLst>
           </p:cNvPr>
@@ -6331,991 +6419,1629 @@
           </a:p>
         </p:txBody>
       </p:sp>
-      <p:sp>
-        <p:nvSpPr>
-          <p:cNvPr id="2" name="Title 1">
-            <a:extLst>
-              <a:ext uri="{FF2B5EF4-FFF2-40B4-BE49-F238E27FC236}">
-                <a16:creationId xmlns:a16="http://schemas.microsoft.com/office/drawing/2014/main" xmlns="" id="{D6D020BA-2777-45DF-873F-47F8AD7560C2}"/>
-              </a:ext>
-            </a:extLst>
-          </p:cNvPr>
-          <p:cNvSpPr txBox="1">
-            <a:spLocks/>
-          </p:cNvSpPr>
-          <p:nvPr/>
-        </p:nvSpPr>
-        <p:spPr>
-          <a:xfrm>
-            <a:off x="181428" y="636998"/>
-            <a:ext cx="8563626" cy="3554858"/>
-          </a:xfrm>
-          <a:prstGeom prst="rect">
-            <a:avLst/>
-          </a:prstGeom>
-        </p:spPr>
-        <p:txBody>
-          <a:bodyPr vert="horz" lIns="91440" tIns="45720" rIns="91440" bIns="45720" rtlCol="0" anchor="b">
-            <a:normAutofit/>
-          </a:bodyPr>
-          <a:lstStyle>
-            <a:lvl1pPr algn="l" defTabSz="457200" rtl="0" eaLnBrk="1" latinLnBrk="0" hangingPunct="1">
-              <a:spcBef>
-                <a:spcPct val="0"/>
-              </a:spcBef>
-              <a:buNone/>
-              <a:defRPr sz="3200" b="0" i="0" kern="1200" baseline="0">
-                <a:solidFill>
-                  <a:schemeClr val="tx1"/>
-                </a:solidFill>
-                <a:latin typeface="+mj-lt"/>
-                <a:ea typeface="+mj-ea"/>
-                <a:cs typeface="+mj-cs"/>
-              </a:defRPr>
-            </a:lvl1pPr>
-          </a:lstStyle>
-          <a:p>
-            <a:r>
-              <a:rPr lang="en-US" sz="1400" b="1" dirty="0" smtClean="0">
-                <a:solidFill>
-                  <a:srgbClr val="000000"/>
-                </a:solidFill>
-                <a:latin typeface="Courier New" panose="02070309020205020404" pitchFamily="49" charset="0"/>
-                <a:cs typeface="Courier New" panose="02070309020205020404" pitchFamily="49" charset="0"/>
-              </a:rPr>
-              <a:t>FUNCTION </a:t>
-            </a:r>
-            <a:r>
-              <a:rPr lang="en-US" sz="1400" dirty="0" err="1" smtClean="0">
-                <a:solidFill>
-                  <a:srgbClr val="000000"/>
-                </a:solidFill>
-                <a:latin typeface="Courier New" panose="02070309020205020404" pitchFamily="49" charset="0"/>
-                <a:cs typeface="Courier New" panose="02070309020205020404" pitchFamily="49" charset="0"/>
-              </a:rPr>
-              <a:t>simplex_opt</a:t>
-            </a:r>
-            <a:r>
-              <a:rPr lang="en-US" sz="1400" dirty="0" smtClean="0">
-                <a:solidFill>
-                  <a:srgbClr val="000000"/>
-                </a:solidFill>
-                <a:latin typeface="Courier New" panose="02070309020205020404" pitchFamily="49" charset="0"/>
-                <a:cs typeface="Courier New" panose="02070309020205020404" pitchFamily="49" charset="0"/>
-              </a:rPr>
-              <a:t>():</a:t>
-            </a:r>
-            <a:endParaRPr lang="en-US" sz="1400" b="1" dirty="0" smtClean="0">
-              <a:solidFill>
-                <a:srgbClr val="000000"/>
-              </a:solidFill>
-              <a:latin typeface="Courier New" panose="02070309020205020404" pitchFamily="49" charset="0"/>
-              <a:cs typeface="Courier New" panose="02070309020205020404" pitchFamily="49" charset="0"/>
-            </a:endParaRPr>
-          </a:p>
-          <a:p>
-            <a:r>
-              <a:rPr lang="en-US" sz="1400" b="1" dirty="0" smtClean="0">
-                <a:solidFill>
-                  <a:srgbClr val="000000"/>
-                </a:solidFill>
-                <a:latin typeface="Courier New" panose="02070309020205020404" pitchFamily="49" charset="0"/>
-                <a:cs typeface="Courier New" panose="02070309020205020404" pitchFamily="49" charset="0"/>
-              </a:rPr>
-              <a:t>INPUT:</a:t>
-            </a:r>
-            <a:r>
-              <a:rPr lang="en-US" sz="1200" b="1" dirty="0" smtClean="0">
-                <a:solidFill>
-                  <a:srgbClr val="000000"/>
-                </a:solidFill>
-                <a:latin typeface="Courier New" panose="02070309020205020404" pitchFamily="49" charset="0"/>
-                <a:cs typeface="Courier New" panose="02070309020205020404" pitchFamily="49" charset="0"/>
-              </a:rPr>
-              <a:t> </a:t>
-            </a:r>
-            <a:r>
-              <a:rPr lang="en-US" sz="1200" i="1" dirty="0" err="1" smtClean="0">
-                <a:solidFill>
-                  <a:srgbClr val="000000"/>
-                </a:solidFill>
-                <a:latin typeface="Courier New" panose="02070309020205020404" pitchFamily="49" charset="0"/>
-                <a:cs typeface="Courier New" panose="02070309020205020404" pitchFamily="49" charset="0"/>
-              </a:rPr>
-              <a:t>target_vars</a:t>
-            </a:r>
-            <a:r>
-              <a:rPr lang="en-US" sz="1200" dirty="0" smtClean="0">
-                <a:solidFill>
-                  <a:srgbClr val="000000"/>
-                </a:solidFill>
-                <a:latin typeface="Courier New" panose="02070309020205020404" pitchFamily="49" charset="0"/>
-                <a:cs typeface="Courier New" panose="02070309020205020404" pitchFamily="49" charset="0"/>
-              </a:rPr>
-              <a:t>: coefficients of target function, </a:t>
-            </a:r>
-            <a:r>
-              <a:rPr lang="en-US" sz="1200" i="1" dirty="0" err="1" smtClean="0">
-                <a:solidFill>
-                  <a:srgbClr val="000000"/>
-                </a:solidFill>
-                <a:latin typeface="Courier New" panose="02070309020205020404" pitchFamily="49" charset="0"/>
-                <a:cs typeface="Courier New" panose="02070309020205020404" pitchFamily="49" charset="0"/>
-              </a:rPr>
-              <a:t>target_q</a:t>
-            </a:r>
-            <a:r>
-              <a:rPr lang="en-US" sz="1200" dirty="0">
-                <a:solidFill>
-                  <a:srgbClr val="000000"/>
-                </a:solidFill>
-                <a:latin typeface="Courier New" panose="02070309020205020404" pitchFamily="49" charset="0"/>
-                <a:cs typeface="Courier New" panose="02070309020205020404" pitchFamily="49" charset="0"/>
-              </a:rPr>
-              <a:t>:</a:t>
-            </a:r>
-            <a:r>
-              <a:rPr lang="en-US" sz="1200" dirty="0" smtClean="0">
-                <a:solidFill>
-                  <a:srgbClr val="000000"/>
-                </a:solidFill>
-                <a:latin typeface="Courier New" panose="02070309020205020404" pitchFamily="49" charset="0"/>
-                <a:cs typeface="Courier New" panose="02070309020205020404" pitchFamily="49" charset="0"/>
-              </a:rPr>
-              <a:t> </a:t>
-            </a:r>
-            <a:r>
-              <a:rPr lang="en-US" sz="1200" dirty="0">
-                <a:solidFill>
-                  <a:srgbClr val="000000"/>
-                </a:solidFill>
-                <a:latin typeface="Courier New" panose="02070309020205020404" pitchFamily="49" charset="0"/>
-                <a:cs typeface="Courier New" panose="02070309020205020404" pitchFamily="49" charset="0"/>
-              </a:rPr>
-              <a:t>free number of </a:t>
-            </a:r>
-            <a:r>
-              <a:rPr lang="en-US" sz="1200" dirty="0" smtClean="0">
-                <a:solidFill>
-                  <a:srgbClr val="000000"/>
-                </a:solidFill>
-                <a:latin typeface="Courier New" panose="02070309020205020404" pitchFamily="49" charset="0"/>
-                <a:cs typeface="Courier New" panose="02070309020205020404" pitchFamily="49" charset="0"/>
-              </a:rPr>
-              <a:t>target function, </a:t>
-            </a:r>
-            <a:r>
-              <a:rPr lang="en-US" sz="1200" i="1" dirty="0" err="1" smtClean="0">
-                <a:solidFill>
-                  <a:srgbClr val="000000"/>
-                </a:solidFill>
-                <a:latin typeface="Courier New" panose="02070309020205020404" pitchFamily="49" charset="0"/>
-                <a:cs typeface="Courier New" panose="02070309020205020404" pitchFamily="49" charset="0"/>
-              </a:rPr>
-              <a:t>target_direction</a:t>
-            </a:r>
-            <a:r>
-              <a:rPr lang="en-US" sz="1200" dirty="0">
-                <a:solidFill>
-                  <a:srgbClr val="000000"/>
-                </a:solidFill>
-                <a:latin typeface="Courier New" panose="02070309020205020404" pitchFamily="49" charset="0"/>
-                <a:cs typeface="Courier New" panose="02070309020205020404" pitchFamily="49" charset="0"/>
-              </a:rPr>
-              <a:t>:</a:t>
-            </a:r>
-            <a:r>
-              <a:rPr lang="en-US" sz="1200" dirty="0" smtClean="0">
-                <a:solidFill>
-                  <a:srgbClr val="000000"/>
-                </a:solidFill>
-                <a:latin typeface="Courier New" panose="02070309020205020404" pitchFamily="49" charset="0"/>
-                <a:cs typeface="Courier New" panose="02070309020205020404" pitchFamily="49" charset="0"/>
-              </a:rPr>
-              <a:t> </a:t>
-            </a:r>
-            <a:r>
-              <a:rPr lang="en-US" sz="1200" dirty="0">
-                <a:solidFill>
-                  <a:srgbClr val="000000"/>
-                </a:solidFill>
-                <a:latin typeface="Courier New" panose="02070309020205020404" pitchFamily="49" charset="0"/>
-                <a:cs typeface="Courier New" panose="02070309020205020404" pitchFamily="49" charset="0"/>
-              </a:rPr>
-              <a:t>min or max of </a:t>
-            </a:r>
-            <a:r>
-              <a:rPr lang="en-US" sz="1200" dirty="0" smtClean="0">
-                <a:solidFill>
-                  <a:srgbClr val="000000"/>
-                </a:solidFill>
-                <a:latin typeface="Courier New" panose="02070309020205020404" pitchFamily="49" charset="0"/>
-                <a:cs typeface="Courier New" panose="02070309020205020404" pitchFamily="49" charset="0"/>
-              </a:rPr>
-              <a:t>target function, </a:t>
-            </a:r>
-            <a:r>
-              <a:rPr lang="en-US" sz="1200" i="1" dirty="0" err="1" smtClean="0">
-                <a:solidFill>
-                  <a:srgbClr val="000000"/>
-                </a:solidFill>
-                <a:latin typeface="Courier New" panose="02070309020205020404" pitchFamily="49" charset="0"/>
-                <a:cs typeface="Courier New" panose="02070309020205020404" pitchFamily="49" charset="0"/>
-              </a:rPr>
-              <a:t>const_a</a:t>
-            </a:r>
-            <a:r>
-              <a:rPr lang="en-US" sz="1200" dirty="0">
-                <a:solidFill>
-                  <a:srgbClr val="000000"/>
-                </a:solidFill>
-                <a:latin typeface="Courier New" panose="02070309020205020404" pitchFamily="49" charset="0"/>
-                <a:cs typeface="Courier New" panose="02070309020205020404" pitchFamily="49" charset="0"/>
-              </a:rPr>
-              <a:t>:</a:t>
-            </a:r>
-            <a:r>
-              <a:rPr lang="en-US" sz="1200" dirty="0" smtClean="0">
-                <a:solidFill>
-                  <a:srgbClr val="000000"/>
-                </a:solidFill>
-                <a:latin typeface="Courier New" panose="02070309020205020404" pitchFamily="49" charset="0"/>
-                <a:cs typeface="Courier New" panose="02070309020205020404" pitchFamily="49" charset="0"/>
-              </a:rPr>
-              <a:t> </a:t>
-            </a:r>
-            <a:r>
-              <a:rPr lang="en-US" sz="1200" dirty="0">
-                <a:solidFill>
-                  <a:srgbClr val="000000"/>
-                </a:solidFill>
-                <a:latin typeface="Courier New" panose="02070309020205020404" pitchFamily="49" charset="0"/>
-                <a:cs typeface="Courier New" panose="02070309020205020404" pitchFamily="49" charset="0"/>
-              </a:rPr>
-              <a:t>matrix of coefficients in </a:t>
-            </a:r>
-            <a:r>
-              <a:rPr lang="en-US" sz="1200" dirty="0" smtClean="0">
-                <a:solidFill>
-                  <a:srgbClr val="000000"/>
-                </a:solidFill>
-                <a:latin typeface="Courier New" panose="02070309020205020404" pitchFamily="49" charset="0"/>
-                <a:cs typeface="Courier New" panose="02070309020205020404" pitchFamily="49" charset="0"/>
-              </a:rPr>
-              <a:t>constrains, </a:t>
-            </a:r>
-            <a:r>
-              <a:rPr lang="en-US" sz="1200" i="1" dirty="0" err="1" smtClean="0">
-                <a:solidFill>
-                  <a:srgbClr val="000000"/>
-                </a:solidFill>
-                <a:latin typeface="Courier New" panose="02070309020205020404" pitchFamily="49" charset="0"/>
-                <a:cs typeface="Courier New" panose="02070309020205020404" pitchFamily="49" charset="0"/>
-              </a:rPr>
-              <a:t>const_b</a:t>
-            </a:r>
-            <a:r>
-              <a:rPr lang="en-US" sz="1200" dirty="0">
-                <a:solidFill>
-                  <a:srgbClr val="000000"/>
-                </a:solidFill>
-                <a:latin typeface="Courier New" panose="02070309020205020404" pitchFamily="49" charset="0"/>
-                <a:cs typeface="Courier New" panose="02070309020205020404" pitchFamily="49" charset="0"/>
-              </a:rPr>
-              <a:t>:</a:t>
-            </a:r>
-            <a:r>
-              <a:rPr lang="en-US" sz="1200" dirty="0" smtClean="0">
-                <a:solidFill>
-                  <a:srgbClr val="000000"/>
-                </a:solidFill>
-                <a:latin typeface="Courier New" panose="02070309020205020404" pitchFamily="49" charset="0"/>
-                <a:cs typeface="Courier New" panose="02070309020205020404" pitchFamily="49" charset="0"/>
-              </a:rPr>
-              <a:t> </a:t>
-            </a:r>
-            <a:r>
-              <a:rPr lang="en-US" sz="1200" dirty="0">
-                <a:solidFill>
-                  <a:srgbClr val="000000"/>
-                </a:solidFill>
-                <a:latin typeface="Courier New" panose="02070309020205020404" pitchFamily="49" charset="0"/>
-                <a:cs typeface="Courier New" panose="02070309020205020404" pitchFamily="49" charset="0"/>
-              </a:rPr>
-              <a:t>matrix of right part of </a:t>
-            </a:r>
-            <a:r>
-              <a:rPr lang="en-US" sz="1200" dirty="0" smtClean="0">
-                <a:solidFill>
-                  <a:srgbClr val="000000"/>
-                </a:solidFill>
-                <a:latin typeface="Courier New" panose="02070309020205020404" pitchFamily="49" charset="0"/>
-                <a:cs typeface="Courier New" panose="02070309020205020404" pitchFamily="49" charset="0"/>
-              </a:rPr>
-              <a:t>constraints</a:t>
-            </a:r>
-          </a:p>
-          <a:p>
-            <a:r>
-              <a:rPr lang="en-US" sz="1400" b="1" dirty="0" smtClean="0">
-                <a:solidFill>
-                  <a:srgbClr val="000000"/>
-                </a:solidFill>
-                <a:latin typeface="Courier New" panose="02070309020205020404" pitchFamily="49" charset="0"/>
-                <a:cs typeface="Courier New" panose="02070309020205020404" pitchFamily="49" charset="0"/>
-              </a:rPr>
-              <a:t>OUTPUT: </a:t>
-            </a:r>
-            <a:r>
-              <a:rPr lang="en-US" sz="1200" i="1" dirty="0" err="1" smtClean="0">
-                <a:solidFill>
-                  <a:srgbClr val="000000"/>
-                </a:solidFill>
-                <a:latin typeface="Courier New" panose="02070309020205020404" pitchFamily="49" charset="0"/>
-                <a:cs typeface="Courier New" panose="02070309020205020404" pitchFamily="49" charset="0"/>
-              </a:rPr>
-              <a:t>xs</a:t>
-            </a:r>
-            <a:r>
-              <a:rPr lang="en-US" sz="1200" i="1" dirty="0" smtClean="0">
-                <a:solidFill>
-                  <a:srgbClr val="000000"/>
-                </a:solidFill>
-                <a:latin typeface="Courier New" panose="02070309020205020404" pitchFamily="49" charset="0"/>
-                <a:cs typeface="Courier New" panose="02070309020205020404" pitchFamily="49" charset="0"/>
-              </a:rPr>
-              <a:t>:</a:t>
-            </a:r>
-            <a:r>
-              <a:rPr lang="en-US" sz="1400" b="1" dirty="0">
-                <a:solidFill>
-                  <a:srgbClr val="000000"/>
-                </a:solidFill>
-                <a:latin typeface="Courier New" panose="02070309020205020404" pitchFamily="49" charset="0"/>
-                <a:cs typeface="Courier New" panose="02070309020205020404" pitchFamily="49" charset="0"/>
-              </a:rPr>
-              <a:t> </a:t>
-            </a:r>
-            <a:r>
-              <a:rPr lang="en-US" sz="1200" dirty="0" smtClean="0">
-                <a:solidFill>
-                  <a:srgbClr val="000000"/>
-                </a:solidFill>
-                <a:latin typeface="Courier New" panose="02070309020205020404" pitchFamily="49" charset="0"/>
-                <a:cs typeface="Courier New" panose="02070309020205020404" pitchFamily="49" charset="0"/>
-              </a:rPr>
-              <a:t>optimal value of variables, </a:t>
-            </a:r>
-            <a:r>
-              <a:rPr lang="en-US" sz="1200" i="1" dirty="0" err="1" smtClean="0">
-                <a:solidFill>
-                  <a:srgbClr val="000000"/>
-                </a:solidFill>
-                <a:latin typeface="Courier New" panose="02070309020205020404" pitchFamily="49" charset="0"/>
-                <a:cs typeface="Courier New" panose="02070309020205020404" pitchFamily="49" charset="0"/>
-              </a:rPr>
-              <a:t>cur_F</a:t>
-            </a:r>
-            <a:r>
-              <a:rPr lang="en-US" sz="1200" dirty="0" smtClean="0">
-                <a:solidFill>
-                  <a:srgbClr val="000000"/>
-                </a:solidFill>
-                <a:latin typeface="Courier New" panose="02070309020205020404" pitchFamily="49" charset="0"/>
-                <a:cs typeface="Courier New" panose="02070309020205020404" pitchFamily="49" charset="0"/>
-              </a:rPr>
-              <a:t>: optimal value of target function</a:t>
-            </a:r>
-          </a:p>
-          <a:p>
-            <a:endParaRPr lang="ru-RU" sz="1200" dirty="0" smtClean="0">
-              <a:solidFill>
-                <a:srgbClr val="000000"/>
-              </a:solidFill>
-              <a:latin typeface="Courier New" panose="02070309020205020404" pitchFamily="49" charset="0"/>
-              <a:cs typeface="Courier New" panose="02070309020205020404" pitchFamily="49" charset="0"/>
-            </a:endParaRPr>
-          </a:p>
-          <a:p>
-            <a:r>
-              <a:rPr lang="en-US" sz="1200" dirty="0">
-                <a:solidFill>
-                  <a:srgbClr val="000000"/>
-                </a:solidFill>
-                <a:latin typeface="Courier New" panose="02070309020205020404" pitchFamily="49" charset="0"/>
-                <a:cs typeface="Courier New" panose="02070309020205020404" pitchFamily="49" charset="0"/>
-              </a:rPr>
-              <a:t>Reducing the problem to the canonical </a:t>
-            </a:r>
-            <a:r>
-              <a:rPr lang="en-US" sz="1200" dirty="0" smtClean="0">
-                <a:solidFill>
-                  <a:srgbClr val="000000"/>
-                </a:solidFill>
-                <a:latin typeface="Courier New" panose="02070309020205020404" pitchFamily="49" charset="0"/>
-                <a:cs typeface="Courier New" panose="02070309020205020404" pitchFamily="49" charset="0"/>
-              </a:rPr>
-              <a:t>form</a:t>
-            </a:r>
-            <a:r>
-              <a:rPr lang="ru-RU" sz="1200" dirty="0" smtClean="0">
-                <a:solidFill>
-                  <a:srgbClr val="000000"/>
-                </a:solidFill>
-                <a:latin typeface="Courier New" panose="02070309020205020404" pitchFamily="49" charset="0"/>
-                <a:cs typeface="Courier New" panose="02070309020205020404" pitchFamily="49" charset="0"/>
-              </a:rPr>
-              <a:t> (</a:t>
-            </a:r>
-            <a:r>
-              <a:rPr lang="en-US" sz="1200" dirty="0">
-                <a:solidFill>
-                  <a:srgbClr val="000000"/>
-                </a:solidFill>
-                <a:latin typeface="Courier New" panose="02070309020205020404" pitchFamily="49" charset="0"/>
-                <a:cs typeface="Courier New" panose="02070309020205020404" pitchFamily="49" charset="0"/>
-              </a:rPr>
-              <a:t>replace inequality with equality</a:t>
-            </a:r>
-            <a:r>
-              <a:rPr lang="ru-RU" sz="1200" dirty="0" smtClean="0">
-                <a:solidFill>
-                  <a:srgbClr val="000000"/>
-                </a:solidFill>
-                <a:latin typeface="Courier New" panose="02070309020205020404" pitchFamily="49" charset="0"/>
-                <a:cs typeface="Courier New" panose="02070309020205020404" pitchFamily="49" charset="0"/>
-              </a:rPr>
-              <a:t>)</a:t>
-            </a:r>
-            <a:endParaRPr lang="en-US" sz="1200" dirty="0" smtClean="0">
-              <a:solidFill>
-                <a:srgbClr val="000000"/>
-              </a:solidFill>
-              <a:latin typeface="Courier New" panose="02070309020205020404" pitchFamily="49" charset="0"/>
-              <a:cs typeface="Courier New" panose="02070309020205020404" pitchFamily="49" charset="0"/>
-            </a:endParaRPr>
-          </a:p>
-          <a:p>
-            <a:r>
-              <a:rPr lang="en-US" sz="1200" i="1" dirty="0" err="1">
-                <a:solidFill>
-                  <a:srgbClr val="000000"/>
-                </a:solidFill>
-                <a:latin typeface="Courier New" panose="02070309020205020404" pitchFamily="49" charset="0"/>
-                <a:cs typeface="Courier New" panose="02070309020205020404" pitchFamily="49" charset="0"/>
-              </a:rPr>
-              <a:t>s</a:t>
-            </a:r>
-            <a:r>
-              <a:rPr lang="en-US" sz="1200" i="1" dirty="0" err="1" smtClean="0">
-                <a:solidFill>
-                  <a:srgbClr val="000000"/>
-                </a:solidFill>
-                <a:latin typeface="Courier New" panose="02070309020205020404" pitchFamily="49" charset="0"/>
-                <a:cs typeface="Courier New" panose="02070309020205020404" pitchFamily="49" charset="0"/>
-              </a:rPr>
-              <a:t>t</a:t>
-            </a:r>
-            <a:r>
-              <a:rPr lang="en-US" sz="1200" dirty="0" smtClean="0">
-                <a:solidFill>
-                  <a:srgbClr val="000000"/>
-                </a:solidFill>
-                <a:latin typeface="Courier New" panose="02070309020205020404" pitchFamily="49" charset="0"/>
-                <a:cs typeface="Courier New" panose="02070309020205020404" pitchFamily="49" charset="0"/>
-              </a:rPr>
-              <a:t> = initializing simplex table</a:t>
-            </a:r>
-          </a:p>
-          <a:p>
-            <a:r>
-              <a:rPr lang="en-US" sz="1200" i="1" dirty="0" err="1" smtClean="0">
-                <a:solidFill>
-                  <a:srgbClr val="000000"/>
-                </a:solidFill>
-                <a:latin typeface="Courier New" panose="02070309020205020404" pitchFamily="49" charset="0"/>
-                <a:cs typeface="Courier New" panose="02070309020205020404" pitchFamily="49" charset="0"/>
-              </a:rPr>
-              <a:t>cur_F</a:t>
-            </a:r>
-            <a:r>
-              <a:rPr lang="en-US" sz="1200" dirty="0" smtClean="0">
-                <a:solidFill>
-                  <a:srgbClr val="000000"/>
-                </a:solidFill>
-                <a:latin typeface="Courier New" panose="02070309020205020404" pitchFamily="49" charset="0"/>
-                <a:cs typeface="Courier New" panose="02070309020205020404" pitchFamily="49" charset="0"/>
-              </a:rPr>
-              <a:t> = </a:t>
-            </a:r>
-            <a:r>
-              <a:rPr lang="en-US" sz="1200" i="1" dirty="0" err="1" smtClean="0">
-                <a:solidFill>
-                  <a:srgbClr val="000000"/>
-                </a:solidFill>
-                <a:latin typeface="Courier New" panose="02070309020205020404" pitchFamily="49" charset="0"/>
-                <a:cs typeface="Courier New" panose="02070309020205020404" pitchFamily="49" charset="0"/>
-              </a:rPr>
-              <a:t>target_q</a:t>
-            </a:r>
-            <a:endParaRPr lang="en-US" sz="1200" i="1" dirty="0" smtClean="0">
-              <a:solidFill>
-                <a:srgbClr val="000000"/>
-              </a:solidFill>
-              <a:latin typeface="Courier New" panose="02070309020205020404" pitchFamily="49" charset="0"/>
-              <a:cs typeface="Courier New" panose="02070309020205020404" pitchFamily="49" charset="0"/>
-            </a:endParaRPr>
-          </a:p>
-          <a:p>
-            <a:endParaRPr lang="en-US" sz="1200" dirty="0">
-              <a:solidFill>
-                <a:srgbClr val="000000"/>
-              </a:solidFill>
-              <a:latin typeface="Courier New" panose="02070309020205020404" pitchFamily="49" charset="0"/>
-              <a:cs typeface="Courier New" panose="02070309020205020404" pitchFamily="49" charset="0"/>
-            </a:endParaRPr>
-          </a:p>
-          <a:p>
-            <a:r>
-              <a:rPr lang="en-US" sz="1200" b="1" dirty="0">
-                <a:solidFill>
-                  <a:srgbClr val="000000"/>
-                </a:solidFill>
-                <a:latin typeface="Courier New" panose="02070309020205020404" pitchFamily="49" charset="0"/>
-                <a:cs typeface="Courier New" panose="02070309020205020404" pitchFamily="49" charset="0"/>
-              </a:rPr>
-              <a:t>While</a:t>
-            </a:r>
-            <a:r>
-              <a:rPr lang="en-US" sz="1200" dirty="0">
-                <a:solidFill>
-                  <a:srgbClr val="000000"/>
-                </a:solidFill>
-                <a:latin typeface="Courier New" panose="02070309020205020404" pitchFamily="49" charset="0"/>
-                <a:cs typeface="Courier New" panose="02070309020205020404" pitchFamily="49" charset="0"/>
-              </a:rPr>
-              <a:t> solution </a:t>
-            </a:r>
-            <a:r>
-              <a:rPr lang="en-US" sz="1200" dirty="0" smtClean="0">
-                <a:solidFill>
-                  <a:srgbClr val="000000"/>
-                </a:solidFill>
-                <a:latin typeface="Courier New" panose="02070309020205020404" pitchFamily="49" charset="0"/>
-                <a:cs typeface="Courier New" panose="02070309020205020404" pitchFamily="49" charset="0"/>
-              </a:rPr>
-              <a:t>is not found and the </a:t>
-            </a:r>
-            <a:r>
-              <a:rPr lang="en-US" sz="1200" dirty="0">
-                <a:solidFill>
-                  <a:srgbClr val="000000"/>
-                </a:solidFill>
-                <a:latin typeface="Courier New" panose="02070309020205020404" pitchFamily="49" charset="0"/>
-                <a:cs typeface="Courier New" panose="02070309020205020404" pitchFamily="49" charset="0"/>
-              </a:rPr>
-              <a:t>number of steps </a:t>
-            </a:r>
-            <a:r>
-              <a:rPr lang="en-US" sz="1200" dirty="0" smtClean="0">
-                <a:solidFill>
-                  <a:srgbClr val="000000"/>
-                </a:solidFill>
-                <a:latin typeface="Courier New" panose="02070309020205020404" pitchFamily="49" charset="0"/>
-                <a:cs typeface="Courier New" panose="02070309020205020404" pitchFamily="49" charset="0"/>
-              </a:rPr>
-              <a:t>doesn’t exceed 10,000:</a:t>
-            </a:r>
-          </a:p>
-          <a:p>
-            <a:r>
-              <a:rPr lang="en-US" sz="1200" dirty="0">
-                <a:solidFill>
-                  <a:srgbClr val="000000"/>
-                </a:solidFill>
-                <a:latin typeface="Courier New" panose="02070309020205020404" pitchFamily="49" charset="0"/>
-                <a:cs typeface="Courier New" panose="02070309020205020404" pitchFamily="49" charset="0"/>
-              </a:rPr>
-              <a:t>	</a:t>
-            </a:r>
-            <a:r>
-              <a:rPr lang="en-US" sz="1200" i="1" dirty="0" err="1">
-                <a:solidFill>
-                  <a:srgbClr val="000000"/>
-                </a:solidFill>
-                <a:latin typeface="Courier New" panose="02070309020205020404" pitchFamily="49" charset="0"/>
-                <a:cs typeface="Courier New" panose="02070309020205020404" pitchFamily="49" charset="0"/>
-              </a:rPr>
-              <a:t>selected_column</a:t>
-            </a:r>
-            <a:r>
-              <a:rPr lang="en-US" sz="1200" i="1" dirty="0">
-                <a:solidFill>
-                  <a:srgbClr val="000000"/>
-                </a:solidFill>
-                <a:latin typeface="Courier New" panose="02070309020205020404" pitchFamily="49" charset="0"/>
-                <a:cs typeface="Courier New" panose="02070309020205020404" pitchFamily="49" charset="0"/>
-              </a:rPr>
-              <a:t> </a:t>
-            </a:r>
-            <a:r>
-              <a:rPr lang="en-US" sz="1200" dirty="0">
-                <a:solidFill>
-                  <a:srgbClr val="000000"/>
-                </a:solidFill>
-                <a:latin typeface="Courier New" panose="02070309020205020404" pitchFamily="49" charset="0"/>
-                <a:cs typeface="Courier New" panose="02070309020205020404" pitchFamily="49" charset="0"/>
-              </a:rPr>
-              <a:t>= index </a:t>
-            </a:r>
-            <a:r>
-              <a:rPr lang="en-US" sz="1200" dirty="0" smtClean="0">
-                <a:solidFill>
-                  <a:srgbClr val="000000"/>
-                </a:solidFill>
-                <a:latin typeface="Courier New" panose="02070309020205020404" pitchFamily="49" charset="0"/>
-                <a:cs typeface="Courier New" panose="02070309020205020404" pitchFamily="49" charset="0"/>
-              </a:rPr>
-              <a:t>of minimum </a:t>
-            </a:r>
-            <a:r>
-              <a:rPr lang="en-US" sz="1200" dirty="0">
-                <a:solidFill>
-                  <a:srgbClr val="000000"/>
-                </a:solidFill>
-                <a:latin typeface="Courier New" panose="02070309020205020404" pitchFamily="49" charset="0"/>
-                <a:cs typeface="Courier New" panose="02070309020205020404" pitchFamily="49" charset="0"/>
-              </a:rPr>
-              <a:t>negative </a:t>
-            </a:r>
-            <a:r>
-              <a:rPr lang="en-US" sz="1200" dirty="0" smtClean="0">
-                <a:solidFill>
-                  <a:srgbClr val="000000"/>
-                </a:solidFill>
-                <a:latin typeface="Courier New" panose="02070309020205020404" pitchFamily="49" charset="0"/>
-                <a:cs typeface="Courier New" panose="02070309020205020404" pitchFamily="49" charset="0"/>
-              </a:rPr>
-              <a:t>element of </a:t>
-            </a:r>
-            <a:r>
-              <a:rPr lang="en-US" sz="1200" i="1" dirty="0" err="1" smtClean="0">
-                <a:solidFill>
-                  <a:srgbClr val="000000"/>
-                </a:solidFill>
-                <a:latin typeface="Courier New" panose="02070309020205020404" pitchFamily="49" charset="0"/>
-                <a:cs typeface="Courier New" panose="02070309020205020404" pitchFamily="49" charset="0"/>
-              </a:rPr>
-              <a:t>target_vars</a:t>
-            </a:r>
-            <a:endParaRPr lang="ru-RU" sz="1200" i="1" dirty="0">
-              <a:solidFill>
-                <a:srgbClr val="000000"/>
-              </a:solidFill>
-              <a:latin typeface="Courier New" panose="02070309020205020404" pitchFamily="49" charset="0"/>
-              <a:cs typeface="Courier New" panose="02070309020205020404" pitchFamily="49" charset="0"/>
-            </a:endParaRPr>
-          </a:p>
-          <a:p>
-            <a:r>
-              <a:rPr lang="ru-RU" sz="1200" dirty="0">
-                <a:solidFill>
-                  <a:srgbClr val="000000"/>
-                </a:solidFill>
-                <a:latin typeface="Courier New" panose="02070309020205020404" pitchFamily="49" charset="0"/>
-                <a:cs typeface="Courier New" panose="02070309020205020404" pitchFamily="49" charset="0"/>
-              </a:rPr>
-              <a:t>     </a:t>
-            </a:r>
-            <a:r>
-              <a:rPr lang="en-US" sz="1200" i="1" dirty="0" err="1" smtClean="0">
-                <a:solidFill>
-                  <a:srgbClr val="000000"/>
-                </a:solidFill>
-                <a:latin typeface="Courier New" panose="02070309020205020404" pitchFamily="49" charset="0"/>
-                <a:cs typeface="Courier New" panose="02070309020205020404" pitchFamily="49" charset="0"/>
-              </a:rPr>
-              <a:t>selected_row</a:t>
-            </a:r>
-            <a:r>
-              <a:rPr lang="en-US" sz="1200" dirty="0" smtClean="0">
-                <a:solidFill>
-                  <a:srgbClr val="000000"/>
-                </a:solidFill>
-                <a:latin typeface="Courier New" panose="02070309020205020404" pitchFamily="49" charset="0"/>
-                <a:cs typeface="Courier New" panose="02070309020205020404" pitchFamily="49" charset="0"/>
-              </a:rPr>
-              <a:t> </a:t>
-            </a:r>
-            <a:r>
-              <a:rPr lang="en-US" sz="1200" dirty="0">
-                <a:solidFill>
-                  <a:srgbClr val="000000"/>
-                </a:solidFill>
-                <a:latin typeface="Courier New" panose="02070309020205020404" pitchFamily="49" charset="0"/>
-                <a:cs typeface="Courier New" panose="02070309020205020404" pitchFamily="49" charset="0"/>
-              </a:rPr>
-              <a:t>= </a:t>
-            </a:r>
-            <a:r>
-              <a:rPr lang="en-US" sz="1200" dirty="0" smtClean="0">
-                <a:solidFill>
-                  <a:srgbClr val="000000"/>
-                </a:solidFill>
-                <a:latin typeface="Courier New" panose="02070309020205020404" pitchFamily="49" charset="0"/>
-                <a:cs typeface="Courier New" panose="02070309020205020404" pitchFamily="49" charset="0"/>
-              </a:rPr>
-              <a:t>index </a:t>
-            </a:r>
-            <a:r>
-              <a:rPr lang="en-US" sz="1200" dirty="0">
-                <a:solidFill>
-                  <a:srgbClr val="000000"/>
-                </a:solidFill>
-                <a:latin typeface="Courier New" panose="02070309020205020404" pitchFamily="49" charset="0"/>
-                <a:cs typeface="Courier New" panose="02070309020205020404" pitchFamily="49" charset="0"/>
-              </a:rPr>
-              <a:t>of minimum </a:t>
-            </a:r>
-            <a:r>
-              <a:rPr lang="en-US" sz="1200" dirty="0" smtClean="0">
-                <a:solidFill>
-                  <a:srgbClr val="000000"/>
-                </a:solidFill>
-                <a:latin typeface="Courier New" panose="02070309020205020404" pitchFamily="49" charset="0"/>
-                <a:cs typeface="Courier New" panose="02070309020205020404" pitchFamily="49" charset="0"/>
-              </a:rPr>
-              <a:t>value of list </a:t>
-            </a:r>
-            <a:r>
-              <a:rPr lang="en-US" sz="1200" i="1" dirty="0" err="1" smtClean="0">
-                <a:solidFill>
-                  <a:srgbClr val="000000"/>
-                </a:solidFill>
-                <a:latin typeface="Courier New" panose="02070309020205020404" pitchFamily="49" charset="0"/>
-                <a:cs typeface="Courier New" panose="02070309020205020404" pitchFamily="49" charset="0"/>
-              </a:rPr>
-              <a:t>const_b</a:t>
-            </a:r>
-            <a:r>
-              <a:rPr lang="en-US" sz="1200" i="1" dirty="0" smtClean="0">
-                <a:solidFill>
-                  <a:srgbClr val="000000"/>
-                </a:solidFill>
-                <a:latin typeface="Courier New" panose="02070309020205020404" pitchFamily="49" charset="0"/>
-                <a:cs typeface="Courier New" panose="02070309020205020404" pitchFamily="49" charset="0"/>
-              </a:rPr>
-              <a:t> </a:t>
-            </a:r>
-            <a:r>
-              <a:rPr lang="en-US" sz="1200" dirty="0" smtClean="0">
-                <a:solidFill>
-                  <a:srgbClr val="000000"/>
-                </a:solidFill>
-                <a:latin typeface="Courier New" panose="02070309020205020404" pitchFamily="49" charset="0"/>
-                <a:cs typeface="Courier New" panose="02070309020205020404" pitchFamily="49" charset="0"/>
-              </a:rPr>
-              <a:t>divided by elements of </a:t>
-            </a:r>
-            <a:r>
-              <a:rPr lang="en-US" sz="1200" i="1" dirty="0" err="1" smtClean="0">
-                <a:solidFill>
-                  <a:srgbClr val="000000"/>
-                </a:solidFill>
-                <a:latin typeface="Courier New" panose="02070309020205020404" pitchFamily="49" charset="0"/>
-                <a:cs typeface="Courier New" panose="02070309020205020404" pitchFamily="49" charset="0"/>
-              </a:rPr>
-              <a:t>const_a</a:t>
-            </a:r>
-            <a:r>
-              <a:rPr lang="ru-RU" sz="1200" i="1" dirty="0" smtClean="0">
-                <a:solidFill>
-                  <a:srgbClr val="000000"/>
-                </a:solidFill>
-                <a:latin typeface="Courier New" panose="02070309020205020404" pitchFamily="49" charset="0"/>
-                <a:cs typeface="Courier New" panose="02070309020205020404" pitchFamily="49" charset="0"/>
-              </a:rPr>
-              <a:t> </a:t>
-            </a:r>
-            <a:r>
-              <a:rPr lang="en-US" sz="1200" i="1" dirty="0" smtClean="0">
-                <a:solidFill>
-                  <a:srgbClr val="000000"/>
-                </a:solidFill>
-                <a:latin typeface="Courier New" panose="02070309020205020404" pitchFamily="49" charset="0"/>
-                <a:cs typeface="Courier New" panose="02070309020205020404" pitchFamily="49" charset="0"/>
-              </a:rPr>
-              <a:t>	</a:t>
-            </a:r>
-            <a:r>
-              <a:rPr lang="en-US" sz="1200" dirty="0" smtClean="0">
-                <a:solidFill>
-                  <a:srgbClr val="000000"/>
-                </a:solidFill>
-                <a:latin typeface="Courier New" panose="02070309020205020404" pitchFamily="49" charset="0"/>
-                <a:cs typeface="Courier New" panose="02070309020205020404" pitchFamily="49" charset="0"/>
-              </a:rPr>
-              <a:t>for a </a:t>
-            </a:r>
-            <a:r>
-              <a:rPr lang="en-US" sz="1200" i="1" dirty="0" err="1" smtClean="0">
-                <a:solidFill>
-                  <a:srgbClr val="000000"/>
-                </a:solidFill>
-                <a:latin typeface="Courier New" panose="02070309020205020404" pitchFamily="49" charset="0"/>
-                <a:cs typeface="Courier New" panose="02070309020205020404" pitchFamily="49" charset="0"/>
-              </a:rPr>
-              <a:t>selected_column</a:t>
-            </a:r>
-            <a:endParaRPr lang="en-US" sz="1200" i="1" dirty="0" smtClean="0">
-              <a:solidFill>
-                <a:srgbClr val="000000"/>
-              </a:solidFill>
-              <a:latin typeface="Courier New" panose="02070309020205020404" pitchFamily="49" charset="0"/>
-              <a:cs typeface="Courier New" panose="02070309020205020404" pitchFamily="49" charset="0"/>
-            </a:endParaRPr>
-          </a:p>
-          <a:p>
-            <a:r>
-              <a:rPr lang="en-US" sz="1200" i="1" dirty="0">
-                <a:solidFill>
-                  <a:srgbClr val="000000"/>
-                </a:solidFill>
-                <a:latin typeface="Courier New" panose="02070309020205020404" pitchFamily="49" charset="0"/>
-                <a:cs typeface="Courier New" panose="02070309020205020404" pitchFamily="49" charset="0"/>
-              </a:rPr>
-              <a:t>	</a:t>
-            </a:r>
-            <a:endParaRPr lang="en-US" sz="1200" i="1" dirty="0" smtClean="0">
-              <a:solidFill>
-                <a:srgbClr val="000000"/>
-              </a:solidFill>
-              <a:latin typeface="Courier New" panose="02070309020205020404" pitchFamily="49" charset="0"/>
-              <a:cs typeface="Courier New" panose="02070309020205020404" pitchFamily="49" charset="0"/>
-            </a:endParaRPr>
-          </a:p>
-          <a:p>
-            <a:r>
-              <a:rPr lang="en-US" sz="1200" i="1" dirty="0">
-                <a:solidFill>
-                  <a:srgbClr val="000000"/>
-                </a:solidFill>
-                <a:latin typeface="Courier New" panose="02070309020205020404" pitchFamily="49" charset="0"/>
-                <a:cs typeface="Courier New" panose="02070309020205020404" pitchFamily="49" charset="0"/>
-              </a:rPr>
-              <a:t>	</a:t>
-            </a:r>
-            <a:r>
-              <a:rPr lang="en-US" sz="1200" b="1" dirty="0" err="1" smtClean="0">
-                <a:solidFill>
-                  <a:srgbClr val="000000"/>
-                </a:solidFill>
-                <a:latin typeface="Courier New" panose="02070309020205020404" pitchFamily="49" charset="0"/>
-                <a:cs typeface="Courier New" panose="02070309020205020404" pitchFamily="49" charset="0"/>
-              </a:rPr>
-              <a:t>recalculate_table</a:t>
-            </a:r>
-            <a:r>
-              <a:rPr lang="en-US" sz="1200" i="1" dirty="0" smtClean="0">
-                <a:solidFill>
-                  <a:srgbClr val="000000"/>
-                </a:solidFill>
-                <a:latin typeface="Courier New" panose="02070309020205020404" pitchFamily="49" charset="0"/>
-                <a:cs typeface="Courier New" panose="02070309020205020404" pitchFamily="49" charset="0"/>
-              </a:rPr>
-              <a:t>(</a:t>
-            </a:r>
-            <a:r>
-              <a:rPr lang="en-US" sz="1200" i="1" dirty="0" err="1" smtClean="0">
-                <a:solidFill>
-                  <a:srgbClr val="000000"/>
-                </a:solidFill>
-                <a:latin typeface="Courier New" panose="02070309020205020404" pitchFamily="49" charset="0"/>
-                <a:cs typeface="Courier New" panose="02070309020205020404" pitchFamily="49" charset="0"/>
-              </a:rPr>
-              <a:t>selected_row</a:t>
-            </a:r>
-            <a:r>
-              <a:rPr lang="en-US" sz="1200" i="1" dirty="0">
-                <a:solidFill>
-                  <a:srgbClr val="000000"/>
-                </a:solidFill>
-                <a:latin typeface="Courier New" panose="02070309020205020404" pitchFamily="49" charset="0"/>
-                <a:cs typeface="Courier New" panose="02070309020205020404" pitchFamily="49" charset="0"/>
-              </a:rPr>
-              <a:t>, </a:t>
-            </a:r>
-            <a:r>
-              <a:rPr lang="en-US" sz="1200" i="1" dirty="0" err="1">
-                <a:solidFill>
-                  <a:srgbClr val="000000"/>
-                </a:solidFill>
-                <a:latin typeface="Courier New" panose="02070309020205020404" pitchFamily="49" charset="0"/>
-                <a:cs typeface="Courier New" panose="02070309020205020404" pitchFamily="49" charset="0"/>
-              </a:rPr>
-              <a:t>selected_column</a:t>
-            </a:r>
-            <a:r>
-              <a:rPr lang="en-US" sz="1200" i="1" dirty="0">
-                <a:solidFill>
-                  <a:srgbClr val="000000"/>
-                </a:solidFill>
-                <a:latin typeface="Courier New" panose="02070309020205020404" pitchFamily="49" charset="0"/>
-                <a:cs typeface="Courier New" panose="02070309020205020404" pitchFamily="49" charset="0"/>
-              </a:rPr>
-              <a:t>)</a:t>
-            </a:r>
-            <a:endParaRPr lang="en-US" sz="1200" i="1" dirty="0" smtClean="0">
-              <a:solidFill>
-                <a:srgbClr val="000000"/>
-              </a:solidFill>
-              <a:latin typeface="Courier New" panose="02070309020205020404" pitchFamily="49" charset="0"/>
-              <a:cs typeface="Courier New" panose="02070309020205020404" pitchFamily="49" charset="0"/>
-            </a:endParaRPr>
-          </a:p>
-          <a:p>
-            <a:endParaRPr lang="en-US" sz="1200" dirty="0">
-              <a:solidFill>
-                <a:srgbClr val="000000"/>
-              </a:solidFill>
-              <a:latin typeface="Courier New" panose="02070309020205020404" pitchFamily="49" charset="0"/>
-              <a:cs typeface="Courier New" panose="02070309020205020404" pitchFamily="49" charset="0"/>
-            </a:endParaRPr>
-          </a:p>
-          <a:p>
-            <a:r>
-              <a:rPr lang="en-US" sz="1200" b="1" dirty="0" smtClean="0">
-                <a:solidFill>
-                  <a:srgbClr val="000000"/>
-                </a:solidFill>
-                <a:latin typeface="Courier New" panose="02070309020205020404" pitchFamily="49" charset="0"/>
-                <a:cs typeface="Courier New" panose="02070309020205020404" pitchFamily="49" charset="0"/>
-              </a:rPr>
-              <a:t>return </a:t>
-            </a:r>
-            <a:r>
-              <a:rPr lang="en-US" sz="1200" dirty="0" err="1" smtClean="0">
-                <a:solidFill>
-                  <a:srgbClr val="000000"/>
-                </a:solidFill>
-                <a:latin typeface="Courier New" panose="02070309020205020404" pitchFamily="49" charset="0"/>
-                <a:cs typeface="Courier New" panose="02070309020205020404" pitchFamily="49" charset="0"/>
-              </a:rPr>
-              <a:t>st.answer</a:t>
-            </a:r>
-            <a:r>
-              <a:rPr lang="en-US" sz="1200" dirty="0" smtClean="0">
-                <a:solidFill>
-                  <a:srgbClr val="000000"/>
-                </a:solidFill>
-                <a:latin typeface="Courier New" panose="02070309020205020404" pitchFamily="49" charset="0"/>
-                <a:cs typeface="Courier New" panose="02070309020205020404" pitchFamily="49" charset="0"/>
-              </a:rPr>
-              <a:t>()</a:t>
-            </a:r>
-          </a:p>
-        </p:txBody>
-      </p:sp>
+      <mc:AlternateContent xmlns:mc="http://schemas.openxmlformats.org/markup-compatibility/2006">
+        <mc:Choice xmlns:a14="http://schemas.microsoft.com/office/drawing/2010/main" Requires="a14">
+          <p:sp>
+            <p:nvSpPr>
+              <p:cNvPr id="2" name="Title 1">
+                <a:extLst>
+                  <a:ext uri="{FF2B5EF4-FFF2-40B4-BE49-F238E27FC236}">
+                    <a16:creationId xmlns="" xmlns:a16="http://schemas.microsoft.com/office/drawing/2014/main" id="{D6D020BA-2777-45DF-873F-47F8AD7560C2}"/>
+                  </a:ext>
+                </a:extLst>
+              </p:cNvPr>
+              <p:cNvSpPr txBox="1">
+                <a:spLocks/>
+              </p:cNvSpPr>
+              <p:nvPr/>
+            </p:nvSpPr>
+            <p:spPr>
+              <a:xfrm>
+                <a:off x="90714" y="400692"/>
+                <a:ext cx="8919722" cy="4058292"/>
+              </a:xfrm>
+              <a:prstGeom prst="rect">
+                <a:avLst/>
+              </a:prstGeom>
+            </p:spPr>
+            <p:txBody>
+              <a:bodyPr vert="horz" lIns="91440" tIns="45720" rIns="91440" bIns="45720" rtlCol="0" anchor="b">
+                <a:normAutofit fontScale="92500" lnSpcReduction="20000"/>
+              </a:bodyPr>
+              <a:lstStyle>
+                <a:lvl1pPr algn="l" defTabSz="457200" rtl="0" eaLnBrk="1" latinLnBrk="0" hangingPunct="1">
+                  <a:spcBef>
+                    <a:spcPct val="0"/>
+                  </a:spcBef>
+                  <a:buNone/>
+                  <a:defRPr sz="3200" b="0" i="0" kern="1200" baseline="0">
+                    <a:solidFill>
+                      <a:schemeClr val="tx1"/>
+                    </a:solidFill>
+                    <a:latin typeface="+mj-lt"/>
+                    <a:ea typeface="+mj-ea"/>
+                    <a:cs typeface="+mj-cs"/>
+                  </a:defRPr>
+                </a:lvl1pPr>
+              </a:lstStyle>
+              <a:p>
+                <a:r>
+                  <a:rPr lang="en-US" sz="1400" b="1" dirty="0" smtClean="0">
+                    <a:solidFill>
+                      <a:srgbClr val="000000"/>
+                    </a:solidFill>
+                    <a:latin typeface="Courier New" panose="02070309020205020404" pitchFamily="49" charset="0"/>
+                    <a:cs typeface="Courier New" panose="02070309020205020404" pitchFamily="49" charset="0"/>
+                  </a:rPr>
+                  <a:t>FUNCTION </a:t>
+                </a:r>
+                <a:r>
+                  <a:rPr lang="en-US" sz="1400" dirty="0" err="1" smtClean="0">
+                    <a:solidFill>
+                      <a:srgbClr val="000000"/>
+                    </a:solidFill>
+                    <a:latin typeface="Courier New" panose="02070309020205020404" pitchFamily="49" charset="0"/>
+                    <a:cs typeface="Courier New" panose="02070309020205020404" pitchFamily="49" charset="0"/>
+                  </a:rPr>
+                  <a:t>simplex_opt</a:t>
+                </a:r>
+                <a:r>
+                  <a:rPr lang="en-US" sz="1400" dirty="0" smtClean="0">
+                    <a:solidFill>
+                      <a:srgbClr val="000000"/>
+                    </a:solidFill>
+                    <a:latin typeface="Courier New" panose="02070309020205020404" pitchFamily="49" charset="0"/>
+                    <a:cs typeface="Courier New" panose="02070309020205020404" pitchFamily="49" charset="0"/>
+                  </a:rPr>
+                  <a:t>():</a:t>
+                </a:r>
+                <a:endParaRPr lang="en-US" sz="1400" b="1" dirty="0" smtClean="0">
+                  <a:solidFill>
+                    <a:srgbClr val="000000"/>
+                  </a:solidFill>
+                  <a:latin typeface="Courier New" panose="02070309020205020404" pitchFamily="49" charset="0"/>
+                  <a:cs typeface="Courier New" panose="02070309020205020404" pitchFamily="49" charset="0"/>
+                </a:endParaRPr>
+              </a:p>
+              <a:p>
+                <a:r>
+                  <a:rPr lang="en-US" sz="1400" b="1" dirty="0" smtClean="0">
+                    <a:solidFill>
+                      <a:srgbClr val="000000"/>
+                    </a:solidFill>
+                    <a:latin typeface="Courier New" panose="02070309020205020404" pitchFamily="49" charset="0"/>
+                    <a:cs typeface="Courier New" panose="02070309020205020404" pitchFamily="49" charset="0"/>
+                  </a:rPr>
+                  <a:t>INPUT:</a:t>
+                </a:r>
+                <a:r>
+                  <a:rPr lang="en-US" sz="1200" b="1" dirty="0" smtClean="0">
+                    <a:solidFill>
+                      <a:srgbClr val="000000"/>
+                    </a:solidFill>
+                    <a:latin typeface="Courier New" panose="02070309020205020404" pitchFamily="49" charset="0"/>
+                    <a:cs typeface="Courier New" panose="02070309020205020404" pitchFamily="49" charset="0"/>
+                  </a:rPr>
+                  <a:t> </a:t>
+                </a:r>
+                <a:r>
+                  <a:rPr lang="en-US" sz="1200" i="1" dirty="0" err="1" smtClean="0">
+                    <a:solidFill>
+                      <a:srgbClr val="000000"/>
+                    </a:solidFill>
+                    <a:latin typeface="Courier New" panose="02070309020205020404" pitchFamily="49" charset="0"/>
+                    <a:cs typeface="Courier New" panose="02070309020205020404" pitchFamily="49" charset="0"/>
+                  </a:rPr>
+                  <a:t>target_vars</a:t>
+                </a:r>
+                <a:r>
+                  <a:rPr lang="en-US" sz="1200" dirty="0" smtClean="0">
+                    <a:solidFill>
+                      <a:srgbClr val="000000"/>
+                    </a:solidFill>
+                    <a:latin typeface="Courier New" panose="02070309020205020404" pitchFamily="49" charset="0"/>
+                    <a:cs typeface="Courier New" panose="02070309020205020404" pitchFamily="49" charset="0"/>
+                  </a:rPr>
+                  <a:t>: coefficients of target function, </a:t>
+                </a:r>
+                <a:r>
+                  <a:rPr lang="en-US" sz="1200" i="1" dirty="0" err="1" smtClean="0">
+                    <a:solidFill>
+                      <a:srgbClr val="000000"/>
+                    </a:solidFill>
+                    <a:latin typeface="Courier New" panose="02070309020205020404" pitchFamily="49" charset="0"/>
+                    <a:cs typeface="Courier New" panose="02070309020205020404" pitchFamily="49" charset="0"/>
+                  </a:rPr>
+                  <a:t>target_q</a:t>
+                </a:r>
+                <a:r>
+                  <a:rPr lang="en-US" sz="1200" dirty="0">
+                    <a:solidFill>
+                      <a:srgbClr val="000000"/>
+                    </a:solidFill>
+                    <a:latin typeface="Courier New" panose="02070309020205020404" pitchFamily="49" charset="0"/>
+                    <a:cs typeface="Courier New" panose="02070309020205020404" pitchFamily="49" charset="0"/>
+                  </a:rPr>
+                  <a:t>:</a:t>
+                </a:r>
+                <a:r>
+                  <a:rPr lang="en-US" sz="1200" dirty="0" smtClean="0">
+                    <a:solidFill>
+                      <a:srgbClr val="000000"/>
+                    </a:solidFill>
+                    <a:latin typeface="Courier New" panose="02070309020205020404" pitchFamily="49" charset="0"/>
+                    <a:cs typeface="Courier New" panose="02070309020205020404" pitchFamily="49" charset="0"/>
+                  </a:rPr>
+                  <a:t> </a:t>
+                </a:r>
+                <a:r>
+                  <a:rPr lang="en-US" sz="1200" dirty="0">
+                    <a:solidFill>
+                      <a:srgbClr val="000000"/>
+                    </a:solidFill>
+                    <a:latin typeface="Courier New" panose="02070309020205020404" pitchFamily="49" charset="0"/>
+                    <a:cs typeface="Courier New" panose="02070309020205020404" pitchFamily="49" charset="0"/>
+                  </a:rPr>
+                  <a:t>free number of </a:t>
+                </a:r>
+                <a:r>
+                  <a:rPr lang="en-US" sz="1200" dirty="0" smtClean="0">
+                    <a:solidFill>
+                      <a:srgbClr val="000000"/>
+                    </a:solidFill>
+                    <a:latin typeface="Courier New" panose="02070309020205020404" pitchFamily="49" charset="0"/>
+                    <a:cs typeface="Courier New" panose="02070309020205020404" pitchFamily="49" charset="0"/>
+                  </a:rPr>
+                  <a:t>target function, </a:t>
+                </a:r>
+                <a:r>
+                  <a:rPr lang="en-US" sz="1200" i="1" dirty="0" err="1" smtClean="0">
+                    <a:solidFill>
+                      <a:srgbClr val="000000"/>
+                    </a:solidFill>
+                    <a:latin typeface="Courier New" panose="02070309020205020404" pitchFamily="49" charset="0"/>
+                    <a:cs typeface="Courier New" panose="02070309020205020404" pitchFamily="49" charset="0"/>
+                  </a:rPr>
+                  <a:t>target_direction</a:t>
+                </a:r>
+                <a:r>
+                  <a:rPr lang="en-US" sz="1200" dirty="0">
+                    <a:solidFill>
+                      <a:srgbClr val="000000"/>
+                    </a:solidFill>
+                    <a:latin typeface="Courier New" panose="02070309020205020404" pitchFamily="49" charset="0"/>
+                    <a:cs typeface="Courier New" panose="02070309020205020404" pitchFamily="49" charset="0"/>
+                  </a:rPr>
+                  <a:t>:</a:t>
+                </a:r>
+                <a:r>
+                  <a:rPr lang="en-US" sz="1200" dirty="0" smtClean="0">
+                    <a:solidFill>
+                      <a:srgbClr val="000000"/>
+                    </a:solidFill>
+                    <a:latin typeface="Courier New" panose="02070309020205020404" pitchFamily="49" charset="0"/>
+                    <a:cs typeface="Courier New" panose="02070309020205020404" pitchFamily="49" charset="0"/>
+                  </a:rPr>
+                  <a:t> </a:t>
+                </a:r>
+                <a:r>
+                  <a:rPr lang="en-US" sz="1200" dirty="0">
+                    <a:solidFill>
+                      <a:srgbClr val="000000"/>
+                    </a:solidFill>
+                    <a:latin typeface="Courier New" panose="02070309020205020404" pitchFamily="49" charset="0"/>
+                    <a:cs typeface="Courier New" panose="02070309020205020404" pitchFamily="49" charset="0"/>
+                  </a:rPr>
+                  <a:t>min or max of </a:t>
+                </a:r>
+                <a:r>
+                  <a:rPr lang="en-US" sz="1200" dirty="0" smtClean="0">
+                    <a:solidFill>
+                      <a:srgbClr val="000000"/>
+                    </a:solidFill>
+                    <a:latin typeface="Courier New" panose="02070309020205020404" pitchFamily="49" charset="0"/>
+                    <a:cs typeface="Courier New" panose="02070309020205020404" pitchFamily="49" charset="0"/>
+                  </a:rPr>
+                  <a:t>target function, </a:t>
+                </a:r>
+                <a:r>
+                  <a:rPr lang="en-US" sz="1200" i="1" dirty="0" err="1" smtClean="0">
+                    <a:solidFill>
+                      <a:srgbClr val="000000"/>
+                    </a:solidFill>
+                    <a:latin typeface="Courier New" panose="02070309020205020404" pitchFamily="49" charset="0"/>
+                    <a:cs typeface="Courier New" panose="02070309020205020404" pitchFamily="49" charset="0"/>
+                  </a:rPr>
+                  <a:t>const_a</a:t>
+                </a:r>
+                <a:r>
+                  <a:rPr lang="en-US" sz="1200" dirty="0">
+                    <a:solidFill>
+                      <a:srgbClr val="000000"/>
+                    </a:solidFill>
+                    <a:latin typeface="Courier New" panose="02070309020205020404" pitchFamily="49" charset="0"/>
+                    <a:cs typeface="Courier New" panose="02070309020205020404" pitchFamily="49" charset="0"/>
+                  </a:rPr>
+                  <a:t>:</a:t>
+                </a:r>
+                <a:r>
+                  <a:rPr lang="en-US" sz="1200" dirty="0" smtClean="0">
+                    <a:solidFill>
+                      <a:srgbClr val="000000"/>
+                    </a:solidFill>
+                    <a:latin typeface="Courier New" panose="02070309020205020404" pitchFamily="49" charset="0"/>
+                    <a:cs typeface="Courier New" panose="02070309020205020404" pitchFamily="49" charset="0"/>
+                  </a:rPr>
+                  <a:t> </a:t>
+                </a:r>
+                <a:r>
+                  <a:rPr lang="en-US" sz="1200" dirty="0">
+                    <a:solidFill>
+                      <a:srgbClr val="000000"/>
+                    </a:solidFill>
+                    <a:latin typeface="Courier New" panose="02070309020205020404" pitchFamily="49" charset="0"/>
+                    <a:cs typeface="Courier New" panose="02070309020205020404" pitchFamily="49" charset="0"/>
+                  </a:rPr>
+                  <a:t>matrix of coefficients in </a:t>
+                </a:r>
+                <a:r>
+                  <a:rPr lang="en-US" sz="1200" dirty="0" smtClean="0">
+                    <a:solidFill>
+                      <a:srgbClr val="000000"/>
+                    </a:solidFill>
+                    <a:latin typeface="Courier New" panose="02070309020205020404" pitchFamily="49" charset="0"/>
+                    <a:cs typeface="Courier New" panose="02070309020205020404" pitchFamily="49" charset="0"/>
+                  </a:rPr>
+                  <a:t>constrains, </a:t>
+                </a:r>
+                <a:r>
+                  <a:rPr lang="en-US" sz="1200" i="1" dirty="0" err="1" smtClean="0">
+                    <a:solidFill>
+                      <a:srgbClr val="000000"/>
+                    </a:solidFill>
+                    <a:latin typeface="Courier New" panose="02070309020205020404" pitchFamily="49" charset="0"/>
+                    <a:cs typeface="Courier New" panose="02070309020205020404" pitchFamily="49" charset="0"/>
+                  </a:rPr>
+                  <a:t>const_b</a:t>
+                </a:r>
+                <a:r>
+                  <a:rPr lang="en-US" sz="1200" dirty="0">
+                    <a:solidFill>
+                      <a:srgbClr val="000000"/>
+                    </a:solidFill>
+                    <a:latin typeface="Courier New" panose="02070309020205020404" pitchFamily="49" charset="0"/>
+                    <a:cs typeface="Courier New" panose="02070309020205020404" pitchFamily="49" charset="0"/>
+                  </a:rPr>
+                  <a:t>:</a:t>
+                </a:r>
+                <a:r>
+                  <a:rPr lang="en-US" sz="1200" dirty="0" smtClean="0">
+                    <a:solidFill>
+                      <a:srgbClr val="000000"/>
+                    </a:solidFill>
+                    <a:latin typeface="Courier New" panose="02070309020205020404" pitchFamily="49" charset="0"/>
+                    <a:cs typeface="Courier New" panose="02070309020205020404" pitchFamily="49" charset="0"/>
+                  </a:rPr>
+                  <a:t> </a:t>
+                </a:r>
+                <a:r>
+                  <a:rPr lang="en-US" sz="1200" dirty="0">
+                    <a:solidFill>
+                      <a:srgbClr val="000000"/>
+                    </a:solidFill>
+                    <a:latin typeface="Courier New" panose="02070309020205020404" pitchFamily="49" charset="0"/>
+                    <a:cs typeface="Courier New" panose="02070309020205020404" pitchFamily="49" charset="0"/>
+                  </a:rPr>
+                  <a:t>matrix of right part of </a:t>
+                </a:r>
+                <a:r>
+                  <a:rPr lang="en-US" sz="1200" dirty="0" smtClean="0">
+                    <a:solidFill>
+                      <a:srgbClr val="000000"/>
+                    </a:solidFill>
+                    <a:latin typeface="Courier New" panose="02070309020205020404" pitchFamily="49" charset="0"/>
+                    <a:cs typeface="Courier New" panose="02070309020205020404" pitchFamily="49" charset="0"/>
+                  </a:rPr>
+                  <a:t>constraints, </a:t>
+                </a:r>
+                <a:r>
+                  <a:rPr lang="en-US" sz="1200" dirty="0" err="1" smtClean="0">
+                    <a:solidFill>
+                      <a:srgbClr val="000000"/>
+                    </a:solidFill>
+                    <a:latin typeface="Courier New" panose="02070309020205020404" pitchFamily="49" charset="0"/>
+                    <a:cs typeface="Courier New" panose="02070309020205020404" pitchFamily="49" charset="0"/>
+                  </a:rPr>
+                  <a:t>const_signs</a:t>
+                </a:r>
+                <a:r>
+                  <a:rPr lang="en-US" sz="1200" dirty="0" smtClean="0">
+                    <a:solidFill>
+                      <a:srgbClr val="000000"/>
+                    </a:solidFill>
+                    <a:latin typeface="Courier New" panose="02070309020205020404" pitchFamily="49" charset="0"/>
+                    <a:cs typeface="Courier New" panose="02070309020205020404" pitchFamily="49" charset="0"/>
+                  </a:rPr>
+                  <a:t>: inequality signs</a:t>
+                </a:r>
+                <a:endParaRPr lang="en-US" sz="1200" dirty="0" smtClean="0">
+                  <a:solidFill>
+                    <a:srgbClr val="000000"/>
+                  </a:solidFill>
+                  <a:latin typeface="Courier New" panose="02070309020205020404" pitchFamily="49" charset="0"/>
+                  <a:cs typeface="Courier New" panose="02070309020205020404" pitchFamily="49" charset="0"/>
+                </a:endParaRPr>
+              </a:p>
+              <a:p>
+                <a:r>
+                  <a:rPr lang="en-US" sz="1400" b="1" dirty="0" smtClean="0">
+                    <a:solidFill>
+                      <a:srgbClr val="000000"/>
+                    </a:solidFill>
+                    <a:latin typeface="Courier New" panose="02070309020205020404" pitchFamily="49" charset="0"/>
+                    <a:cs typeface="Courier New" panose="02070309020205020404" pitchFamily="49" charset="0"/>
+                  </a:rPr>
+                  <a:t>OUTPUT: </a:t>
+                </a:r>
+                <a:r>
+                  <a:rPr lang="en-US" sz="1200" i="1" dirty="0" err="1" smtClean="0">
+                    <a:solidFill>
+                      <a:srgbClr val="000000"/>
+                    </a:solidFill>
+                    <a:latin typeface="Courier New" panose="02070309020205020404" pitchFamily="49" charset="0"/>
+                    <a:cs typeface="Courier New" panose="02070309020205020404" pitchFamily="49" charset="0"/>
+                  </a:rPr>
+                  <a:t>xs</a:t>
+                </a:r>
+                <a:r>
+                  <a:rPr lang="en-US" sz="1200" i="1" dirty="0" smtClean="0">
+                    <a:solidFill>
+                      <a:srgbClr val="000000"/>
+                    </a:solidFill>
+                    <a:latin typeface="Courier New" panose="02070309020205020404" pitchFamily="49" charset="0"/>
+                    <a:cs typeface="Courier New" panose="02070309020205020404" pitchFamily="49" charset="0"/>
+                  </a:rPr>
+                  <a:t>:</a:t>
+                </a:r>
+                <a:r>
+                  <a:rPr lang="en-US" sz="1400" b="1" dirty="0">
+                    <a:solidFill>
+                      <a:srgbClr val="000000"/>
+                    </a:solidFill>
+                    <a:latin typeface="Courier New" panose="02070309020205020404" pitchFamily="49" charset="0"/>
+                    <a:cs typeface="Courier New" panose="02070309020205020404" pitchFamily="49" charset="0"/>
+                  </a:rPr>
+                  <a:t> </a:t>
+                </a:r>
+                <a:r>
+                  <a:rPr lang="en-US" sz="1200" dirty="0" smtClean="0">
+                    <a:solidFill>
+                      <a:srgbClr val="000000"/>
+                    </a:solidFill>
+                    <a:latin typeface="Courier New" panose="02070309020205020404" pitchFamily="49" charset="0"/>
+                    <a:cs typeface="Courier New" panose="02070309020205020404" pitchFamily="49" charset="0"/>
+                  </a:rPr>
+                  <a:t>optimal value of variables, </a:t>
+                </a:r>
+                <a:r>
+                  <a:rPr lang="en-US" sz="1200" i="1" dirty="0" err="1" smtClean="0">
+                    <a:solidFill>
+                      <a:srgbClr val="000000"/>
+                    </a:solidFill>
+                    <a:latin typeface="Courier New" panose="02070309020205020404" pitchFamily="49" charset="0"/>
+                    <a:cs typeface="Courier New" panose="02070309020205020404" pitchFamily="49" charset="0"/>
+                  </a:rPr>
+                  <a:t>cur_F</a:t>
+                </a:r>
+                <a:r>
+                  <a:rPr lang="en-US" sz="1200" dirty="0" smtClean="0">
+                    <a:solidFill>
+                      <a:srgbClr val="000000"/>
+                    </a:solidFill>
+                    <a:latin typeface="Courier New" panose="02070309020205020404" pitchFamily="49" charset="0"/>
+                    <a:cs typeface="Courier New" panose="02070309020205020404" pitchFamily="49" charset="0"/>
+                  </a:rPr>
+                  <a:t>: optimal value of target function</a:t>
+                </a:r>
+              </a:p>
+              <a:p>
+                <a:endParaRPr lang="ru-RU" sz="1200" dirty="0" smtClean="0">
+                  <a:solidFill>
+                    <a:srgbClr val="000000"/>
+                  </a:solidFill>
+                  <a:latin typeface="Courier New" panose="02070309020205020404" pitchFamily="49" charset="0"/>
+                  <a:cs typeface="Courier New" panose="02070309020205020404" pitchFamily="49" charset="0"/>
+                </a:endParaRPr>
+              </a:p>
+              <a:p>
+                <a:r>
+                  <a:rPr lang="en-US" sz="1200" dirty="0" smtClean="0">
+                    <a:solidFill>
+                      <a:srgbClr val="000000"/>
+                    </a:solidFill>
+                    <a:latin typeface="Courier New" panose="02070309020205020404" pitchFamily="49" charset="0"/>
+                    <a:cs typeface="Courier New" panose="02070309020205020404" pitchFamily="49" charset="0"/>
+                  </a:rPr>
+                  <a:t># Reducing </a:t>
+                </a:r>
+                <a:r>
+                  <a:rPr lang="en-US" sz="1200" dirty="0">
+                    <a:solidFill>
+                      <a:srgbClr val="000000"/>
+                    </a:solidFill>
+                    <a:latin typeface="Courier New" panose="02070309020205020404" pitchFamily="49" charset="0"/>
+                    <a:cs typeface="Courier New" panose="02070309020205020404" pitchFamily="49" charset="0"/>
+                  </a:rPr>
+                  <a:t>the problem to the canonical </a:t>
+                </a:r>
+                <a:r>
+                  <a:rPr lang="en-US" sz="1200" dirty="0" smtClean="0">
+                    <a:solidFill>
+                      <a:srgbClr val="000000"/>
+                    </a:solidFill>
+                    <a:latin typeface="Courier New" panose="02070309020205020404" pitchFamily="49" charset="0"/>
+                    <a:cs typeface="Courier New" panose="02070309020205020404" pitchFamily="49" charset="0"/>
+                  </a:rPr>
+                  <a:t>form</a:t>
+                </a:r>
+                <a:r>
+                  <a:rPr lang="ru-RU" sz="1200" dirty="0" smtClean="0">
+                    <a:solidFill>
+                      <a:srgbClr val="000000"/>
+                    </a:solidFill>
+                    <a:latin typeface="Courier New" panose="02070309020205020404" pitchFamily="49" charset="0"/>
+                    <a:cs typeface="Courier New" panose="02070309020205020404" pitchFamily="49" charset="0"/>
+                  </a:rPr>
+                  <a:t> (</a:t>
+                </a:r>
+                <a:r>
+                  <a:rPr lang="en-US" sz="1200" dirty="0">
+                    <a:solidFill>
+                      <a:srgbClr val="000000"/>
+                    </a:solidFill>
+                    <a:latin typeface="Courier New" panose="02070309020205020404" pitchFamily="49" charset="0"/>
+                    <a:cs typeface="Courier New" panose="02070309020205020404" pitchFamily="49" charset="0"/>
+                  </a:rPr>
+                  <a:t>replace inequality with equality</a:t>
+                </a:r>
+                <a:r>
+                  <a:rPr lang="ru-RU" sz="1200" dirty="0" smtClean="0">
+                    <a:solidFill>
+                      <a:srgbClr val="000000"/>
+                    </a:solidFill>
+                    <a:latin typeface="Courier New" panose="02070309020205020404" pitchFamily="49" charset="0"/>
+                    <a:cs typeface="Courier New" panose="02070309020205020404" pitchFamily="49" charset="0"/>
+                  </a:rPr>
+                  <a:t>)</a:t>
+                </a:r>
+              </a:p>
+              <a:p>
+                <a:r>
+                  <a:rPr lang="en-US" sz="1200" dirty="0">
+                    <a:solidFill>
+                      <a:srgbClr val="000000"/>
+                    </a:solidFill>
+                    <a:latin typeface="Courier New" panose="02070309020205020404" pitchFamily="49" charset="0"/>
+                    <a:cs typeface="Courier New" panose="02070309020205020404" pitchFamily="49" charset="0"/>
+                  </a:rPr>
+                  <a:t>i</a:t>
+                </a:r>
+                <a:r>
+                  <a:rPr lang="en-US" sz="1200" dirty="0" smtClean="0">
+                    <a:solidFill>
+                      <a:srgbClr val="000000"/>
+                    </a:solidFill>
+                    <a:latin typeface="Courier New" panose="02070309020205020404" pitchFamily="49" charset="0"/>
+                    <a:cs typeface="Courier New" panose="02070309020205020404" pitchFamily="49" charset="0"/>
+                  </a:rPr>
+                  <a:t>ndices of basis </a:t>
+                </a:r>
+                <a:r>
+                  <a:rPr lang="en-US" sz="1200" dirty="0" err="1" smtClean="0">
+                    <a:solidFill>
+                      <a:srgbClr val="000000"/>
+                    </a:solidFill>
+                    <a:latin typeface="Courier New" panose="02070309020205020404" pitchFamily="49" charset="0"/>
+                    <a:cs typeface="Courier New" panose="02070309020205020404" pitchFamily="49" charset="0"/>
+                  </a:rPr>
+                  <a:t>vars</a:t>
+                </a:r>
+                <a:r>
+                  <a:rPr lang="en-US" sz="1200" dirty="0" smtClean="0">
+                    <a:solidFill>
+                      <a:srgbClr val="000000"/>
+                    </a:solidFill>
+                    <a:latin typeface="Courier New" panose="02070309020205020404" pitchFamily="49" charset="0"/>
+                    <a:cs typeface="Courier New" panose="02070309020205020404" pitchFamily="49" charset="0"/>
+                  </a:rPr>
+                  <a:t> = index of additional </a:t>
+                </a:r>
+                <a:r>
+                  <a:rPr lang="en-US" sz="1200" dirty="0" err="1" smtClean="0">
+                    <a:solidFill>
+                      <a:srgbClr val="000000"/>
+                    </a:solidFill>
+                    <a:latin typeface="Courier New" panose="02070309020205020404" pitchFamily="49" charset="0"/>
+                    <a:cs typeface="Courier New" panose="02070309020205020404" pitchFamily="49" charset="0"/>
+                  </a:rPr>
+                  <a:t>vars</a:t>
+                </a:r>
+                <a:endParaRPr lang="en-US" sz="1200" dirty="0" smtClean="0">
+                  <a:solidFill>
+                    <a:srgbClr val="000000"/>
+                  </a:solidFill>
+                  <a:latin typeface="Courier New" panose="02070309020205020404" pitchFamily="49" charset="0"/>
+                  <a:cs typeface="Courier New" panose="02070309020205020404" pitchFamily="49" charset="0"/>
+                </a:endParaRPr>
+              </a:p>
+              <a:p>
+                <a:r>
+                  <a:rPr lang="en-US" sz="1200" b="1" dirty="0" smtClean="0">
+                    <a:solidFill>
+                      <a:srgbClr val="000000"/>
+                    </a:solidFill>
+                    <a:latin typeface="Courier New" panose="02070309020205020404" pitchFamily="49" charset="0"/>
+                    <a:cs typeface="Courier New" panose="02070309020205020404" pitchFamily="49" charset="0"/>
+                  </a:rPr>
+                  <a:t>If </a:t>
+                </a:r>
+                <a:r>
+                  <a:rPr lang="en-US" sz="1200" i="1" dirty="0" err="1" smtClean="0">
+                    <a:solidFill>
+                      <a:srgbClr val="000000"/>
+                    </a:solidFill>
+                    <a:latin typeface="Courier New" panose="02070309020205020404" pitchFamily="49" charset="0"/>
+                    <a:cs typeface="Courier New" panose="02070309020205020404" pitchFamily="49" charset="0"/>
+                  </a:rPr>
+                  <a:t>target_direction</a:t>
+                </a:r>
+                <a:r>
+                  <a:rPr lang="en-US" sz="1200" i="1" dirty="0" smtClean="0">
+                    <a:solidFill>
+                      <a:srgbClr val="000000"/>
+                    </a:solidFill>
+                    <a:latin typeface="Courier New" panose="02070309020205020404" pitchFamily="49" charset="0"/>
+                    <a:cs typeface="Courier New" panose="02070309020205020404" pitchFamily="49" charset="0"/>
+                  </a:rPr>
+                  <a:t> == ‘max’:</a:t>
+                </a:r>
+              </a:p>
+              <a:p>
+                <a:r>
+                  <a:rPr lang="en-US" sz="1200" i="1" dirty="0">
+                    <a:solidFill>
+                      <a:srgbClr val="000000"/>
+                    </a:solidFill>
+                    <a:latin typeface="Courier New" panose="02070309020205020404" pitchFamily="49" charset="0"/>
+                    <a:cs typeface="Courier New" panose="02070309020205020404" pitchFamily="49" charset="0"/>
+                  </a:rPr>
+                  <a:t>	 </a:t>
+                </a:r>
+                <a:r>
+                  <a:rPr lang="en-US" sz="1200" i="1" dirty="0" err="1" smtClean="0">
+                    <a:solidFill>
+                      <a:srgbClr val="000000"/>
+                    </a:solidFill>
+                    <a:latin typeface="Courier New" panose="02070309020205020404" pitchFamily="49" charset="0"/>
+                    <a:cs typeface="Courier New" panose="02070309020205020404" pitchFamily="49" charset="0"/>
+                  </a:rPr>
+                  <a:t>target_vars</a:t>
+                </a:r>
+                <a:r>
+                  <a:rPr lang="en-US" sz="1200" i="1" dirty="0" smtClean="0">
+                    <a:solidFill>
+                      <a:srgbClr val="000000"/>
+                    </a:solidFill>
+                    <a:latin typeface="Courier New" panose="02070309020205020404" pitchFamily="49" charset="0"/>
+                    <a:cs typeface="Courier New" panose="02070309020205020404" pitchFamily="49" charset="0"/>
+                  </a:rPr>
+                  <a:t> = </a:t>
+                </a:r>
+                <a:r>
+                  <a:rPr lang="en-US" sz="1200" i="1" dirty="0" err="1" smtClean="0">
+                    <a:solidFill>
+                      <a:srgbClr val="000000"/>
+                    </a:solidFill>
+                    <a:latin typeface="Courier New" panose="02070309020205020404" pitchFamily="49" charset="0"/>
+                    <a:cs typeface="Courier New" panose="02070309020205020404" pitchFamily="49" charset="0"/>
+                  </a:rPr>
+                  <a:t>target_vars</a:t>
+                </a:r>
+                <a:r>
+                  <a:rPr lang="en-US" sz="1200" i="1" dirty="0" smtClean="0">
+                    <a:solidFill>
+                      <a:srgbClr val="000000"/>
+                    </a:solidFill>
+                    <a:latin typeface="Courier New" panose="02070309020205020404" pitchFamily="49" charset="0"/>
+                    <a:cs typeface="Courier New" panose="02070309020205020404" pitchFamily="49" charset="0"/>
+                  </a:rPr>
+                  <a:t> * -1</a:t>
+                </a:r>
+              </a:p>
+              <a:p>
+                <a:r>
+                  <a:rPr lang="en-US" sz="1200" i="1" dirty="0">
+                    <a:solidFill>
+                      <a:srgbClr val="000000"/>
+                    </a:solidFill>
+                    <a:latin typeface="Courier New" panose="02070309020205020404" pitchFamily="49" charset="0"/>
+                    <a:cs typeface="Courier New" panose="02070309020205020404" pitchFamily="49" charset="0"/>
+                  </a:rPr>
+                  <a:t>	 </a:t>
+                </a:r>
+                <a:r>
+                  <a:rPr lang="en-US" sz="1200" i="1" dirty="0" err="1" smtClean="0">
+                    <a:solidFill>
+                      <a:srgbClr val="000000"/>
+                    </a:solidFill>
+                    <a:latin typeface="Courier New" panose="02070309020205020404" pitchFamily="49" charset="0"/>
+                    <a:cs typeface="Courier New" panose="02070309020205020404" pitchFamily="49" charset="0"/>
+                  </a:rPr>
+                  <a:t>target_q</a:t>
+                </a:r>
+                <a:r>
+                  <a:rPr lang="en-US" sz="1200" i="1" dirty="0" smtClean="0">
+                    <a:solidFill>
+                      <a:srgbClr val="000000"/>
+                    </a:solidFill>
+                    <a:latin typeface="Courier New" panose="02070309020205020404" pitchFamily="49" charset="0"/>
+                    <a:cs typeface="Courier New" panose="02070309020205020404" pitchFamily="49" charset="0"/>
+                  </a:rPr>
+                  <a:t> = </a:t>
+                </a:r>
+                <a:r>
+                  <a:rPr lang="en-US" sz="1200" i="1" dirty="0" err="1" smtClean="0">
+                    <a:solidFill>
+                      <a:srgbClr val="000000"/>
+                    </a:solidFill>
+                    <a:latin typeface="Courier New" panose="02070309020205020404" pitchFamily="49" charset="0"/>
+                    <a:cs typeface="Courier New" panose="02070309020205020404" pitchFamily="49" charset="0"/>
+                  </a:rPr>
+                  <a:t>target_q</a:t>
+                </a:r>
+                <a:r>
+                  <a:rPr lang="en-US" sz="1200" i="1" dirty="0" smtClean="0">
+                    <a:solidFill>
+                      <a:srgbClr val="000000"/>
+                    </a:solidFill>
+                    <a:latin typeface="Courier New" panose="02070309020205020404" pitchFamily="49" charset="0"/>
+                    <a:cs typeface="Courier New" panose="02070309020205020404" pitchFamily="49" charset="0"/>
+                  </a:rPr>
+                  <a:t> * -1</a:t>
+                </a:r>
+                <a:endParaRPr lang="ru-RU" sz="1200" i="1" dirty="0" smtClean="0">
+                  <a:solidFill>
+                    <a:srgbClr val="000000"/>
+                  </a:solidFill>
+                  <a:latin typeface="Courier New" panose="02070309020205020404" pitchFamily="49" charset="0"/>
+                  <a:cs typeface="Courier New" panose="02070309020205020404" pitchFamily="49" charset="0"/>
+                </a:endParaRPr>
+              </a:p>
+              <a:p>
+                <a:endParaRPr lang="ru-RU" sz="1200" i="1" dirty="0">
+                  <a:solidFill>
+                    <a:srgbClr val="000000"/>
+                  </a:solidFill>
+                  <a:latin typeface="Courier New" panose="02070309020205020404" pitchFamily="49" charset="0"/>
+                  <a:cs typeface="Courier New" panose="02070309020205020404" pitchFamily="49" charset="0"/>
+                </a:endParaRPr>
+              </a:p>
+              <a:p>
+                <a:r>
+                  <a:rPr lang="en-US" sz="1200" b="1" dirty="0">
+                    <a:solidFill>
+                      <a:srgbClr val="000000"/>
+                    </a:solidFill>
+                    <a:latin typeface="Courier New" panose="02070309020205020404" pitchFamily="49" charset="0"/>
+                    <a:cs typeface="Courier New" panose="02070309020205020404" pitchFamily="49" charset="0"/>
+                  </a:rPr>
+                  <a:t>f</a:t>
+                </a:r>
+                <a:r>
+                  <a:rPr lang="en-US" sz="1200" b="1" dirty="0" smtClean="0">
+                    <a:solidFill>
+                      <a:srgbClr val="000000"/>
+                    </a:solidFill>
+                    <a:latin typeface="Courier New" panose="02070309020205020404" pitchFamily="49" charset="0"/>
+                    <a:cs typeface="Courier New" panose="02070309020205020404" pitchFamily="49" charset="0"/>
+                  </a:rPr>
+                  <a:t>or all</a:t>
+                </a:r>
+                <a:r>
+                  <a:rPr lang="en-US" sz="1200" b="1" i="1" dirty="0" smtClean="0">
+                    <a:solidFill>
+                      <a:srgbClr val="000000"/>
+                    </a:solidFill>
+                    <a:latin typeface="Courier New" panose="02070309020205020404" pitchFamily="49" charset="0"/>
+                    <a:cs typeface="Courier New" panose="02070309020205020404" pitchFamily="49" charset="0"/>
+                  </a:rPr>
+                  <a:t> </a:t>
+                </a:r>
+                <a14:m>
+                  <m:oMath xmlns:m="http://schemas.openxmlformats.org/officeDocument/2006/math">
+                    <m:sSub>
+                      <m:sSubPr>
+                        <m:ctrlPr>
+                          <a:rPr lang="en-US" sz="1200" i="1">
+                            <a:solidFill>
+                              <a:srgbClr val="000000"/>
+                            </a:solidFill>
+                            <a:latin typeface="Cambria Math" panose="02040503050406030204" pitchFamily="18" charset="0"/>
+                            <a:cs typeface="Courier New" panose="02070309020205020404" pitchFamily="49" charset="0"/>
+                          </a:rPr>
+                        </m:ctrlPr>
+                      </m:sSubPr>
+                      <m:e>
+                        <m:r>
+                          <a:rPr lang="en-US" sz="1200" i="1">
+                            <a:solidFill>
+                              <a:srgbClr val="000000"/>
+                            </a:solidFill>
+                            <a:latin typeface="Cambria Math" panose="02040503050406030204" pitchFamily="18" charset="0"/>
+                            <a:cs typeface="Courier New" panose="02070309020205020404" pitchFamily="49" charset="0"/>
+                          </a:rPr>
+                          <m:t>𝑎</m:t>
+                        </m:r>
+                      </m:e>
+                      <m:sub>
+                        <m:r>
+                          <a:rPr lang="en-US" sz="1200" i="1">
+                            <a:solidFill>
+                              <a:srgbClr val="000000"/>
+                            </a:solidFill>
+                            <a:latin typeface="Cambria Math" panose="02040503050406030204" pitchFamily="18" charset="0"/>
+                            <a:cs typeface="Courier New" panose="02070309020205020404" pitchFamily="49" charset="0"/>
+                          </a:rPr>
+                          <m:t>𝑖</m:t>
+                        </m:r>
+                      </m:sub>
+                    </m:sSub>
+                  </m:oMath>
+                </a14:m>
+                <a:r>
+                  <a:rPr lang="en-US" sz="1200" b="1" i="1" dirty="0" smtClean="0">
+                    <a:solidFill>
+                      <a:srgbClr val="000000"/>
+                    </a:solidFill>
+                    <a:latin typeface="Courier New" panose="02070309020205020404" pitchFamily="49" charset="0"/>
+                    <a:cs typeface="Courier New" panose="02070309020205020404" pitchFamily="49" charset="0"/>
+                  </a:rPr>
+                  <a:t> </a:t>
+                </a:r>
+                <a:r>
+                  <a:rPr lang="en-US" sz="1200" dirty="0" smtClean="0">
+                    <a:solidFill>
+                      <a:srgbClr val="000000"/>
+                    </a:solidFill>
+                    <a:latin typeface="Courier New" panose="02070309020205020404" pitchFamily="49" charset="0"/>
+                    <a:cs typeface="Courier New" panose="02070309020205020404" pitchFamily="49" charset="0"/>
+                  </a:rPr>
+                  <a:t>in </a:t>
+                </a:r>
+                <a:r>
+                  <a:rPr lang="en-US" sz="1200" i="1" dirty="0" err="1" smtClean="0">
+                    <a:solidFill>
+                      <a:srgbClr val="000000"/>
+                    </a:solidFill>
+                    <a:latin typeface="Courier New" panose="02070309020205020404" pitchFamily="49" charset="0"/>
+                    <a:cs typeface="Courier New" panose="02070309020205020404" pitchFamily="49" charset="0"/>
+                  </a:rPr>
+                  <a:t>const_a</a:t>
+                </a:r>
+                <a:r>
+                  <a:rPr lang="en-US" sz="1200" i="1" dirty="0" smtClean="0">
+                    <a:solidFill>
+                      <a:srgbClr val="000000"/>
+                    </a:solidFill>
+                    <a:latin typeface="Courier New" panose="02070309020205020404" pitchFamily="49" charset="0"/>
+                    <a:cs typeface="Courier New" panose="02070309020205020404" pitchFamily="49" charset="0"/>
+                  </a:rPr>
+                  <a:t>:</a:t>
+                </a:r>
+              </a:p>
+              <a:p>
+                <a:r>
+                  <a:rPr lang="en-US" sz="1200" i="1" dirty="0">
+                    <a:solidFill>
+                      <a:srgbClr val="000000"/>
+                    </a:solidFill>
+                    <a:latin typeface="Courier New" panose="02070309020205020404" pitchFamily="49" charset="0"/>
+                    <a:cs typeface="Courier New" panose="02070309020205020404" pitchFamily="49" charset="0"/>
+                  </a:rPr>
+                  <a:t>	</a:t>
+                </a:r>
+                <a:r>
+                  <a:rPr lang="en-US" sz="1200" i="1" dirty="0" smtClean="0">
+                    <a:solidFill>
+                      <a:srgbClr val="000000"/>
+                    </a:solidFill>
+                    <a:latin typeface="Courier New" panose="02070309020205020404" pitchFamily="49" charset="0"/>
+                    <a:cs typeface="Courier New" panose="02070309020205020404" pitchFamily="49" charset="0"/>
+                  </a:rPr>
+                  <a:t>if </a:t>
+                </a:r>
+                <a14:m>
+                  <m:oMath xmlns:m="http://schemas.openxmlformats.org/officeDocument/2006/math">
+                    <m:sSub>
+                      <m:sSubPr>
+                        <m:ctrlPr>
+                          <a:rPr lang="en-US" sz="1200" i="1">
+                            <a:solidFill>
+                              <a:srgbClr val="000000"/>
+                            </a:solidFill>
+                            <a:latin typeface="Cambria Math" panose="02040503050406030204" pitchFamily="18" charset="0"/>
+                            <a:cs typeface="Courier New" panose="02070309020205020404" pitchFamily="49" charset="0"/>
+                          </a:rPr>
+                        </m:ctrlPr>
+                      </m:sSubPr>
+                      <m:e>
+                        <m:r>
+                          <a:rPr lang="en-US" sz="1200" b="0" i="1" smtClean="0">
+                            <a:solidFill>
+                              <a:srgbClr val="000000"/>
+                            </a:solidFill>
+                            <a:latin typeface="Cambria Math" panose="02040503050406030204" pitchFamily="18" charset="0"/>
+                            <a:cs typeface="Courier New" panose="02070309020205020404" pitchFamily="49" charset="0"/>
+                          </a:rPr>
+                          <m:t>𝑐𝑜𝑛𝑠𝑡</m:t>
+                        </m:r>
+                        <m:r>
+                          <a:rPr lang="en-US" sz="1200" b="0" i="1" smtClean="0">
+                            <a:solidFill>
+                              <a:srgbClr val="000000"/>
+                            </a:solidFill>
+                            <a:latin typeface="Cambria Math" panose="02040503050406030204" pitchFamily="18" charset="0"/>
+                            <a:cs typeface="Courier New" panose="02070309020205020404" pitchFamily="49" charset="0"/>
+                          </a:rPr>
+                          <m:t> </m:t>
+                        </m:r>
+                        <m:r>
+                          <a:rPr lang="en-US" sz="1200" b="0" i="1" smtClean="0">
+                            <a:solidFill>
+                              <a:srgbClr val="000000"/>
+                            </a:solidFill>
+                            <a:latin typeface="Cambria Math" panose="02040503050406030204" pitchFamily="18" charset="0"/>
+                            <a:cs typeface="Courier New" panose="02070309020205020404" pitchFamily="49" charset="0"/>
+                          </a:rPr>
+                          <m:t>𝑠𝑖𝑔𝑛𝑠</m:t>
+                        </m:r>
+                      </m:e>
+                      <m:sub>
+                        <m:r>
+                          <a:rPr lang="en-US" sz="1200" i="1">
+                            <a:solidFill>
+                              <a:srgbClr val="000000"/>
+                            </a:solidFill>
+                            <a:latin typeface="Cambria Math" panose="02040503050406030204" pitchFamily="18" charset="0"/>
+                            <a:cs typeface="Courier New" panose="02070309020205020404" pitchFamily="49" charset="0"/>
+                          </a:rPr>
+                          <m:t>𝑖</m:t>
+                        </m:r>
+                      </m:sub>
+                    </m:sSub>
+                  </m:oMath>
+                </a14:m>
+                <a:r>
+                  <a:rPr lang="en-US" sz="1200" i="1" dirty="0" smtClean="0">
+                    <a:solidFill>
+                      <a:srgbClr val="000000"/>
+                    </a:solidFill>
+                    <a:latin typeface="Courier New" panose="02070309020205020404" pitchFamily="49" charset="0"/>
+                    <a:cs typeface="Courier New" panose="02070309020205020404" pitchFamily="49" charset="0"/>
+                  </a:rPr>
+                  <a:t> equal ‘&gt;’ or ‘&gt;=’:</a:t>
+                </a:r>
+              </a:p>
+              <a:p>
+                <a:r>
+                  <a:rPr lang="en-US" sz="1200" i="1" dirty="0">
+                    <a:solidFill>
+                      <a:srgbClr val="000000"/>
+                    </a:solidFill>
+                    <a:latin typeface="Courier New" panose="02070309020205020404" pitchFamily="49" charset="0"/>
+                    <a:cs typeface="Courier New" panose="02070309020205020404" pitchFamily="49" charset="0"/>
+                  </a:rPr>
+                  <a:t>	</a:t>
+                </a:r>
+                <a:r>
+                  <a:rPr lang="en-US" sz="1200" i="1" dirty="0" smtClean="0">
+                    <a:solidFill>
+                      <a:srgbClr val="000000"/>
+                    </a:solidFill>
+                    <a:latin typeface="Courier New" panose="02070309020205020404" pitchFamily="49" charset="0"/>
+                    <a:cs typeface="Courier New" panose="02070309020205020404" pitchFamily="49" charset="0"/>
+                  </a:rPr>
+                  <a:t>	</a:t>
+                </a:r>
+                <a14:m>
+                  <m:oMath xmlns:m="http://schemas.openxmlformats.org/officeDocument/2006/math">
+                    <m:sSub>
+                      <m:sSubPr>
+                        <m:ctrlPr>
+                          <a:rPr lang="en-US" sz="1200" i="1">
+                            <a:solidFill>
+                              <a:srgbClr val="000000"/>
+                            </a:solidFill>
+                            <a:latin typeface="Cambria Math" panose="02040503050406030204" pitchFamily="18" charset="0"/>
+                            <a:cs typeface="Courier New" panose="02070309020205020404" pitchFamily="49" charset="0"/>
+                          </a:rPr>
+                        </m:ctrlPr>
+                      </m:sSubPr>
+                      <m:e>
+                        <m:r>
+                          <a:rPr lang="en-US" sz="1200" i="1">
+                            <a:solidFill>
+                              <a:srgbClr val="000000"/>
+                            </a:solidFill>
+                            <a:latin typeface="Cambria Math" panose="02040503050406030204" pitchFamily="18" charset="0"/>
+                            <a:cs typeface="Courier New" panose="02070309020205020404" pitchFamily="49" charset="0"/>
+                          </a:rPr>
+                          <m:t>𝑎</m:t>
+                        </m:r>
+                      </m:e>
+                      <m:sub>
+                        <m:r>
+                          <a:rPr lang="en-US" sz="1200" i="1">
+                            <a:solidFill>
+                              <a:srgbClr val="000000"/>
+                            </a:solidFill>
+                            <a:latin typeface="Cambria Math" panose="02040503050406030204" pitchFamily="18" charset="0"/>
+                            <a:cs typeface="Courier New" panose="02070309020205020404" pitchFamily="49" charset="0"/>
+                          </a:rPr>
+                          <m:t>𝑖</m:t>
+                        </m:r>
+                      </m:sub>
+                    </m:sSub>
+                  </m:oMath>
+                </a14:m>
+                <a:r>
+                  <a:rPr lang="en-US" sz="1200" i="1" dirty="0" smtClean="0">
+                    <a:solidFill>
+                      <a:srgbClr val="000000"/>
+                    </a:solidFill>
+                    <a:latin typeface="Courier New" panose="02070309020205020404" pitchFamily="49" charset="0"/>
+                    <a:cs typeface="Courier New" panose="02070309020205020404" pitchFamily="49" charset="0"/>
+                  </a:rPr>
+                  <a:t> = </a:t>
+                </a:r>
+                <a14:m>
+                  <m:oMath xmlns:m="http://schemas.openxmlformats.org/officeDocument/2006/math">
+                    <m:sSub>
+                      <m:sSubPr>
+                        <m:ctrlPr>
+                          <a:rPr lang="en-US" sz="1200" i="1">
+                            <a:solidFill>
+                              <a:srgbClr val="000000"/>
+                            </a:solidFill>
+                            <a:latin typeface="Cambria Math" panose="02040503050406030204" pitchFamily="18" charset="0"/>
+                            <a:cs typeface="Courier New" panose="02070309020205020404" pitchFamily="49" charset="0"/>
+                          </a:rPr>
+                        </m:ctrlPr>
+                      </m:sSubPr>
+                      <m:e>
+                        <m:r>
+                          <a:rPr lang="en-US" sz="1200" i="1">
+                            <a:solidFill>
+                              <a:srgbClr val="000000"/>
+                            </a:solidFill>
+                            <a:latin typeface="Cambria Math" panose="02040503050406030204" pitchFamily="18" charset="0"/>
+                            <a:cs typeface="Courier New" panose="02070309020205020404" pitchFamily="49" charset="0"/>
+                          </a:rPr>
+                          <m:t>𝑎</m:t>
+                        </m:r>
+                      </m:e>
+                      <m:sub>
+                        <m:r>
+                          <a:rPr lang="en-US" sz="1200" i="1">
+                            <a:solidFill>
+                              <a:srgbClr val="000000"/>
+                            </a:solidFill>
+                            <a:latin typeface="Cambria Math" panose="02040503050406030204" pitchFamily="18" charset="0"/>
+                            <a:cs typeface="Courier New" panose="02070309020205020404" pitchFamily="49" charset="0"/>
+                          </a:rPr>
+                          <m:t>𝑖</m:t>
+                        </m:r>
+                      </m:sub>
+                    </m:sSub>
+                  </m:oMath>
+                </a14:m>
+                <a:r>
+                  <a:rPr lang="en-US" sz="1200" i="1" dirty="0" smtClean="0">
+                    <a:solidFill>
+                      <a:srgbClr val="000000"/>
+                    </a:solidFill>
+                    <a:latin typeface="Courier New" panose="02070309020205020404" pitchFamily="49" charset="0"/>
+                    <a:cs typeface="Courier New" panose="02070309020205020404" pitchFamily="49" charset="0"/>
+                  </a:rPr>
+                  <a:t> * -1</a:t>
+                </a:r>
+              </a:p>
+              <a:p>
+                <a:r>
+                  <a:rPr lang="en-US" sz="1200" b="1" i="1" dirty="0">
+                    <a:solidFill>
+                      <a:srgbClr val="000000"/>
+                    </a:solidFill>
+                    <a:latin typeface="Courier New" panose="02070309020205020404" pitchFamily="49" charset="0"/>
+                    <a:cs typeface="Courier New" panose="02070309020205020404" pitchFamily="49" charset="0"/>
+                  </a:rPr>
+                  <a:t>	</a:t>
+                </a:r>
+                <a:endParaRPr lang="en-US" sz="1200" dirty="0" smtClean="0">
+                  <a:solidFill>
+                    <a:srgbClr val="000000"/>
+                  </a:solidFill>
+                  <a:latin typeface="Courier New" panose="02070309020205020404" pitchFamily="49" charset="0"/>
+                  <a:cs typeface="Courier New" panose="02070309020205020404" pitchFamily="49" charset="0"/>
+                </a:endParaRPr>
+              </a:p>
+              <a:p>
+                <a:r>
+                  <a:rPr lang="en-US" sz="1200" i="1" dirty="0" err="1">
+                    <a:solidFill>
+                      <a:srgbClr val="000000"/>
+                    </a:solidFill>
+                    <a:latin typeface="Courier New" panose="02070309020205020404" pitchFamily="49" charset="0"/>
+                    <a:cs typeface="Courier New" panose="02070309020205020404" pitchFamily="49" charset="0"/>
+                  </a:rPr>
+                  <a:t>s</a:t>
+                </a:r>
+                <a:r>
+                  <a:rPr lang="en-US" sz="1200" i="1" dirty="0" err="1" smtClean="0">
+                    <a:solidFill>
+                      <a:srgbClr val="000000"/>
+                    </a:solidFill>
+                    <a:latin typeface="Courier New" panose="02070309020205020404" pitchFamily="49" charset="0"/>
+                    <a:cs typeface="Courier New" panose="02070309020205020404" pitchFamily="49" charset="0"/>
+                  </a:rPr>
+                  <a:t>t</a:t>
+                </a:r>
+                <a:r>
+                  <a:rPr lang="en-US" sz="1200" dirty="0" smtClean="0">
+                    <a:solidFill>
+                      <a:srgbClr val="000000"/>
+                    </a:solidFill>
+                    <a:latin typeface="Courier New" panose="02070309020205020404" pitchFamily="49" charset="0"/>
+                    <a:cs typeface="Courier New" panose="02070309020205020404" pitchFamily="49" charset="0"/>
+                  </a:rPr>
+                  <a:t> = initializing simplex table</a:t>
+                </a:r>
+              </a:p>
+              <a:p>
+                <a:r>
+                  <a:rPr lang="en-US" sz="1200" i="1" dirty="0" err="1" smtClean="0">
+                    <a:solidFill>
+                      <a:srgbClr val="000000"/>
+                    </a:solidFill>
+                    <a:latin typeface="Courier New" panose="02070309020205020404" pitchFamily="49" charset="0"/>
+                    <a:cs typeface="Courier New" panose="02070309020205020404" pitchFamily="49" charset="0"/>
+                  </a:rPr>
+                  <a:t>cur_F</a:t>
+                </a:r>
+                <a:r>
+                  <a:rPr lang="en-US" sz="1200" dirty="0" smtClean="0">
+                    <a:solidFill>
+                      <a:srgbClr val="000000"/>
+                    </a:solidFill>
+                    <a:latin typeface="Courier New" panose="02070309020205020404" pitchFamily="49" charset="0"/>
+                    <a:cs typeface="Courier New" panose="02070309020205020404" pitchFamily="49" charset="0"/>
+                  </a:rPr>
+                  <a:t> = </a:t>
+                </a:r>
+                <a:r>
+                  <a:rPr lang="en-US" sz="1200" i="1" dirty="0" err="1" smtClean="0">
+                    <a:solidFill>
+                      <a:srgbClr val="000000"/>
+                    </a:solidFill>
+                    <a:latin typeface="Courier New" panose="02070309020205020404" pitchFamily="49" charset="0"/>
+                    <a:cs typeface="Courier New" panose="02070309020205020404" pitchFamily="49" charset="0"/>
+                  </a:rPr>
+                  <a:t>target_q</a:t>
+                </a:r>
+                <a:endParaRPr lang="en-US" sz="1200" i="1" dirty="0" smtClean="0">
+                  <a:solidFill>
+                    <a:srgbClr val="000000"/>
+                  </a:solidFill>
+                  <a:latin typeface="Courier New" panose="02070309020205020404" pitchFamily="49" charset="0"/>
+                  <a:cs typeface="Courier New" panose="02070309020205020404" pitchFamily="49" charset="0"/>
+                </a:endParaRPr>
+              </a:p>
+              <a:p>
+                <a:endParaRPr lang="en-US" sz="1200" dirty="0">
+                  <a:solidFill>
+                    <a:srgbClr val="000000"/>
+                  </a:solidFill>
+                  <a:latin typeface="Courier New" panose="02070309020205020404" pitchFamily="49" charset="0"/>
+                  <a:cs typeface="Courier New" panose="02070309020205020404" pitchFamily="49" charset="0"/>
+                </a:endParaRPr>
+              </a:p>
+              <a:p>
+                <a:r>
+                  <a:rPr lang="en-US" sz="1200" b="1" dirty="0">
+                    <a:solidFill>
+                      <a:srgbClr val="000000"/>
+                    </a:solidFill>
+                    <a:latin typeface="Courier New" panose="02070309020205020404" pitchFamily="49" charset="0"/>
+                    <a:cs typeface="Courier New" panose="02070309020205020404" pitchFamily="49" charset="0"/>
+                  </a:rPr>
+                  <a:t>While</a:t>
+                </a:r>
+                <a:r>
+                  <a:rPr lang="en-US" sz="1200" dirty="0">
+                    <a:solidFill>
+                      <a:srgbClr val="000000"/>
+                    </a:solidFill>
+                    <a:latin typeface="Courier New" panose="02070309020205020404" pitchFamily="49" charset="0"/>
+                    <a:cs typeface="Courier New" panose="02070309020205020404" pitchFamily="49" charset="0"/>
+                  </a:rPr>
+                  <a:t> solution </a:t>
+                </a:r>
+                <a:r>
+                  <a:rPr lang="en-US" sz="1200" dirty="0" smtClean="0">
+                    <a:solidFill>
+                      <a:srgbClr val="000000"/>
+                    </a:solidFill>
+                    <a:latin typeface="Courier New" panose="02070309020205020404" pitchFamily="49" charset="0"/>
+                    <a:cs typeface="Courier New" panose="02070309020205020404" pitchFamily="49" charset="0"/>
+                  </a:rPr>
+                  <a:t>is not found and the </a:t>
+                </a:r>
+                <a:r>
+                  <a:rPr lang="en-US" sz="1200" dirty="0">
+                    <a:solidFill>
+                      <a:srgbClr val="000000"/>
+                    </a:solidFill>
+                    <a:latin typeface="Courier New" panose="02070309020205020404" pitchFamily="49" charset="0"/>
+                    <a:cs typeface="Courier New" panose="02070309020205020404" pitchFamily="49" charset="0"/>
+                  </a:rPr>
+                  <a:t>number of steps </a:t>
+                </a:r>
+                <a:r>
+                  <a:rPr lang="en-US" sz="1200" dirty="0" smtClean="0">
+                    <a:solidFill>
+                      <a:srgbClr val="000000"/>
+                    </a:solidFill>
+                    <a:latin typeface="Courier New" panose="02070309020205020404" pitchFamily="49" charset="0"/>
+                    <a:cs typeface="Courier New" panose="02070309020205020404" pitchFamily="49" charset="0"/>
+                  </a:rPr>
+                  <a:t>doesn’t exceed 10,000:</a:t>
+                </a:r>
+              </a:p>
+              <a:p>
+                <a:r>
+                  <a:rPr lang="en-US" sz="1200" dirty="0">
+                    <a:solidFill>
+                      <a:srgbClr val="000000"/>
+                    </a:solidFill>
+                    <a:latin typeface="Courier New" panose="02070309020205020404" pitchFamily="49" charset="0"/>
+                    <a:cs typeface="Courier New" panose="02070309020205020404" pitchFamily="49" charset="0"/>
+                  </a:rPr>
+                  <a:t>	</a:t>
+                </a:r>
+                <a:r>
+                  <a:rPr lang="en-US" sz="1200" i="1" dirty="0" err="1">
+                    <a:solidFill>
+                      <a:srgbClr val="000000"/>
+                    </a:solidFill>
+                    <a:latin typeface="Courier New" panose="02070309020205020404" pitchFamily="49" charset="0"/>
+                    <a:cs typeface="Courier New" panose="02070309020205020404" pitchFamily="49" charset="0"/>
+                  </a:rPr>
+                  <a:t>selected_column</a:t>
+                </a:r>
+                <a:r>
+                  <a:rPr lang="en-US" sz="1200" i="1" dirty="0">
+                    <a:solidFill>
+                      <a:srgbClr val="000000"/>
+                    </a:solidFill>
+                    <a:latin typeface="Courier New" panose="02070309020205020404" pitchFamily="49" charset="0"/>
+                    <a:cs typeface="Courier New" panose="02070309020205020404" pitchFamily="49" charset="0"/>
+                  </a:rPr>
+                  <a:t> </a:t>
+                </a:r>
+                <a:r>
+                  <a:rPr lang="en-US" sz="1200" dirty="0">
+                    <a:solidFill>
+                      <a:srgbClr val="000000"/>
+                    </a:solidFill>
+                    <a:latin typeface="Courier New" panose="02070309020205020404" pitchFamily="49" charset="0"/>
+                    <a:cs typeface="Courier New" panose="02070309020205020404" pitchFamily="49" charset="0"/>
+                  </a:rPr>
+                  <a:t>= index </a:t>
+                </a:r>
+                <a:r>
+                  <a:rPr lang="en-US" sz="1200" dirty="0" smtClean="0">
+                    <a:solidFill>
+                      <a:srgbClr val="000000"/>
+                    </a:solidFill>
+                    <a:latin typeface="Courier New" panose="02070309020205020404" pitchFamily="49" charset="0"/>
+                    <a:cs typeface="Courier New" panose="02070309020205020404" pitchFamily="49" charset="0"/>
+                  </a:rPr>
+                  <a:t>of minimum </a:t>
+                </a:r>
+                <a:r>
+                  <a:rPr lang="en-US" sz="1200" dirty="0">
+                    <a:solidFill>
+                      <a:srgbClr val="000000"/>
+                    </a:solidFill>
+                    <a:latin typeface="Courier New" panose="02070309020205020404" pitchFamily="49" charset="0"/>
+                    <a:cs typeface="Courier New" panose="02070309020205020404" pitchFamily="49" charset="0"/>
+                  </a:rPr>
+                  <a:t>negative </a:t>
+                </a:r>
+                <a:r>
+                  <a:rPr lang="en-US" sz="1200" dirty="0" smtClean="0">
+                    <a:solidFill>
+                      <a:srgbClr val="000000"/>
+                    </a:solidFill>
+                    <a:latin typeface="Courier New" panose="02070309020205020404" pitchFamily="49" charset="0"/>
+                    <a:cs typeface="Courier New" panose="02070309020205020404" pitchFamily="49" charset="0"/>
+                  </a:rPr>
+                  <a:t>element of </a:t>
+                </a:r>
+                <a:r>
+                  <a:rPr lang="en-US" sz="1200" i="1" dirty="0" err="1" smtClean="0">
+                    <a:solidFill>
+                      <a:srgbClr val="000000"/>
+                    </a:solidFill>
+                    <a:latin typeface="Courier New" panose="02070309020205020404" pitchFamily="49" charset="0"/>
+                    <a:cs typeface="Courier New" panose="02070309020205020404" pitchFamily="49" charset="0"/>
+                  </a:rPr>
+                  <a:t>target_vars</a:t>
+                </a:r>
+                <a:endParaRPr lang="ru-RU" sz="1200" i="1" dirty="0">
+                  <a:solidFill>
+                    <a:srgbClr val="000000"/>
+                  </a:solidFill>
+                  <a:latin typeface="Courier New" panose="02070309020205020404" pitchFamily="49" charset="0"/>
+                  <a:cs typeface="Courier New" panose="02070309020205020404" pitchFamily="49" charset="0"/>
+                </a:endParaRPr>
+              </a:p>
+              <a:p>
+                <a:r>
+                  <a:rPr lang="ru-RU" sz="1200" dirty="0">
+                    <a:solidFill>
+                      <a:srgbClr val="000000"/>
+                    </a:solidFill>
+                    <a:latin typeface="Courier New" panose="02070309020205020404" pitchFamily="49" charset="0"/>
+                    <a:cs typeface="Courier New" panose="02070309020205020404" pitchFamily="49" charset="0"/>
+                  </a:rPr>
+                  <a:t>     </a:t>
+                </a:r>
+                <a:r>
+                  <a:rPr lang="en-US" sz="1200" i="1" dirty="0" err="1" smtClean="0">
+                    <a:solidFill>
+                      <a:srgbClr val="000000"/>
+                    </a:solidFill>
+                    <a:latin typeface="Courier New" panose="02070309020205020404" pitchFamily="49" charset="0"/>
+                    <a:cs typeface="Courier New" panose="02070309020205020404" pitchFamily="49" charset="0"/>
+                  </a:rPr>
+                  <a:t>selected_row</a:t>
+                </a:r>
+                <a:r>
+                  <a:rPr lang="en-US" sz="1200" dirty="0" smtClean="0">
+                    <a:solidFill>
+                      <a:srgbClr val="000000"/>
+                    </a:solidFill>
+                    <a:latin typeface="Courier New" panose="02070309020205020404" pitchFamily="49" charset="0"/>
+                    <a:cs typeface="Courier New" panose="02070309020205020404" pitchFamily="49" charset="0"/>
+                  </a:rPr>
+                  <a:t> </a:t>
+                </a:r>
+                <a:r>
+                  <a:rPr lang="en-US" sz="1200" dirty="0">
+                    <a:solidFill>
+                      <a:srgbClr val="000000"/>
+                    </a:solidFill>
+                    <a:latin typeface="Courier New" panose="02070309020205020404" pitchFamily="49" charset="0"/>
+                    <a:cs typeface="Courier New" panose="02070309020205020404" pitchFamily="49" charset="0"/>
+                  </a:rPr>
+                  <a:t>= </a:t>
+                </a:r>
+                <a:r>
+                  <a:rPr lang="en-US" sz="1200" dirty="0" smtClean="0">
+                    <a:solidFill>
+                      <a:srgbClr val="000000"/>
+                    </a:solidFill>
+                    <a:latin typeface="Courier New" panose="02070309020205020404" pitchFamily="49" charset="0"/>
+                    <a:cs typeface="Courier New" panose="02070309020205020404" pitchFamily="49" charset="0"/>
+                  </a:rPr>
+                  <a:t>index </a:t>
+                </a:r>
+                <a:r>
+                  <a:rPr lang="en-US" sz="1200" dirty="0">
+                    <a:solidFill>
+                      <a:srgbClr val="000000"/>
+                    </a:solidFill>
+                    <a:latin typeface="Courier New" panose="02070309020205020404" pitchFamily="49" charset="0"/>
+                    <a:cs typeface="Courier New" panose="02070309020205020404" pitchFamily="49" charset="0"/>
+                  </a:rPr>
+                  <a:t>of minimum </a:t>
+                </a:r>
+                <a:r>
+                  <a:rPr lang="en-US" sz="1200" dirty="0" smtClean="0">
+                    <a:solidFill>
+                      <a:srgbClr val="000000"/>
+                    </a:solidFill>
+                    <a:latin typeface="Courier New" panose="02070309020205020404" pitchFamily="49" charset="0"/>
+                    <a:cs typeface="Courier New" panose="02070309020205020404" pitchFamily="49" charset="0"/>
+                  </a:rPr>
+                  <a:t>value of list </a:t>
+                </a:r>
+                <a:r>
+                  <a:rPr lang="en-US" sz="1200" i="1" dirty="0" err="1" smtClean="0">
+                    <a:solidFill>
+                      <a:srgbClr val="000000"/>
+                    </a:solidFill>
+                    <a:latin typeface="Courier New" panose="02070309020205020404" pitchFamily="49" charset="0"/>
+                    <a:cs typeface="Courier New" panose="02070309020205020404" pitchFamily="49" charset="0"/>
+                  </a:rPr>
+                  <a:t>const_b</a:t>
+                </a:r>
+                <a:r>
+                  <a:rPr lang="en-US" sz="1200" i="1" dirty="0" smtClean="0">
+                    <a:solidFill>
+                      <a:srgbClr val="000000"/>
+                    </a:solidFill>
+                    <a:latin typeface="Courier New" panose="02070309020205020404" pitchFamily="49" charset="0"/>
+                    <a:cs typeface="Courier New" panose="02070309020205020404" pitchFamily="49" charset="0"/>
+                  </a:rPr>
+                  <a:t> </a:t>
+                </a:r>
+                <a:r>
+                  <a:rPr lang="en-US" sz="1200" dirty="0" smtClean="0">
+                    <a:solidFill>
+                      <a:srgbClr val="000000"/>
+                    </a:solidFill>
+                    <a:latin typeface="Courier New" panose="02070309020205020404" pitchFamily="49" charset="0"/>
+                    <a:cs typeface="Courier New" panose="02070309020205020404" pitchFamily="49" charset="0"/>
+                  </a:rPr>
+                  <a:t>divided by elements of </a:t>
+                </a:r>
+                <a:r>
+                  <a:rPr lang="en-US" sz="1200" i="1" dirty="0" err="1" smtClean="0">
+                    <a:solidFill>
+                      <a:srgbClr val="000000"/>
+                    </a:solidFill>
+                    <a:latin typeface="Courier New" panose="02070309020205020404" pitchFamily="49" charset="0"/>
+                    <a:cs typeface="Courier New" panose="02070309020205020404" pitchFamily="49" charset="0"/>
+                  </a:rPr>
+                  <a:t>const_a</a:t>
+                </a:r>
+                <a:r>
+                  <a:rPr lang="ru-RU" sz="1200" i="1" dirty="0" smtClean="0">
+                    <a:solidFill>
+                      <a:srgbClr val="000000"/>
+                    </a:solidFill>
+                    <a:latin typeface="Courier New" panose="02070309020205020404" pitchFamily="49" charset="0"/>
+                    <a:cs typeface="Courier New" panose="02070309020205020404" pitchFamily="49" charset="0"/>
+                  </a:rPr>
+                  <a:t> </a:t>
+                </a:r>
+                <a:r>
+                  <a:rPr lang="en-US" sz="1200" i="1" dirty="0" smtClean="0">
+                    <a:solidFill>
+                      <a:srgbClr val="000000"/>
+                    </a:solidFill>
+                    <a:latin typeface="Courier New" panose="02070309020205020404" pitchFamily="49" charset="0"/>
+                    <a:cs typeface="Courier New" panose="02070309020205020404" pitchFamily="49" charset="0"/>
+                  </a:rPr>
+                  <a:t>	</a:t>
+                </a:r>
+                <a:r>
+                  <a:rPr lang="en-US" sz="1200" dirty="0" smtClean="0">
+                    <a:solidFill>
+                      <a:srgbClr val="000000"/>
+                    </a:solidFill>
+                    <a:latin typeface="Courier New" panose="02070309020205020404" pitchFamily="49" charset="0"/>
+                    <a:cs typeface="Courier New" panose="02070309020205020404" pitchFamily="49" charset="0"/>
+                  </a:rPr>
+                  <a:t>for a </a:t>
+                </a:r>
+                <a:r>
+                  <a:rPr lang="en-US" sz="1200" i="1" dirty="0" err="1" smtClean="0">
+                    <a:solidFill>
+                      <a:srgbClr val="000000"/>
+                    </a:solidFill>
+                    <a:latin typeface="Courier New" panose="02070309020205020404" pitchFamily="49" charset="0"/>
+                    <a:cs typeface="Courier New" panose="02070309020205020404" pitchFamily="49" charset="0"/>
+                  </a:rPr>
+                  <a:t>selected_column</a:t>
+                </a:r>
+                <a:endParaRPr lang="en-US" sz="1200" i="1" dirty="0" smtClean="0">
+                  <a:solidFill>
+                    <a:srgbClr val="000000"/>
+                  </a:solidFill>
+                  <a:latin typeface="Courier New" panose="02070309020205020404" pitchFamily="49" charset="0"/>
+                  <a:cs typeface="Courier New" panose="02070309020205020404" pitchFamily="49" charset="0"/>
+                </a:endParaRPr>
+              </a:p>
+              <a:p>
+                <a:r>
+                  <a:rPr lang="en-US" sz="1200" i="1" dirty="0">
+                    <a:solidFill>
+                      <a:srgbClr val="000000"/>
+                    </a:solidFill>
+                    <a:latin typeface="Courier New" panose="02070309020205020404" pitchFamily="49" charset="0"/>
+                    <a:cs typeface="Courier New" panose="02070309020205020404" pitchFamily="49" charset="0"/>
+                  </a:rPr>
+                  <a:t>	</a:t>
+                </a:r>
+                <a:endParaRPr lang="en-US" sz="1200" i="1" dirty="0" smtClean="0">
+                  <a:solidFill>
+                    <a:srgbClr val="000000"/>
+                  </a:solidFill>
+                  <a:latin typeface="Courier New" panose="02070309020205020404" pitchFamily="49" charset="0"/>
+                  <a:cs typeface="Courier New" panose="02070309020205020404" pitchFamily="49" charset="0"/>
+                </a:endParaRPr>
+              </a:p>
+              <a:p>
+                <a:r>
+                  <a:rPr lang="en-US" sz="1200" i="1" dirty="0">
+                    <a:solidFill>
+                      <a:srgbClr val="000000"/>
+                    </a:solidFill>
+                    <a:latin typeface="Courier New" panose="02070309020205020404" pitchFamily="49" charset="0"/>
+                    <a:cs typeface="Courier New" panose="02070309020205020404" pitchFamily="49" charset="0"/>
+                  </a:rPr>
+                  <a:t>	</a:t>
+                </a:r>
+                <a:r>
+                  <a:rPr lang="en-US" sz="1200" b="1" dirty="0" err="1" smtClean="0">
+                    <a:solidFill>
+                      <a:srgbClr val="000000"/>
+                    </a:solidFill>
+                    <a:latin typeface="Courier New" panose="02070309020205020404" pitchFamily="49" charset="0"/>
+                    <a:cs typeface="Courier New" panose="02070309020205020404" pitchFamily="49" charset="0"/>
+                  </a:rPr>
+                  <a:t>recalculate_table</a:t>
+                </a:r>
+                <a:r>
+                  <a:rPr lang="en-US" sz="1200" i="1" dirty="0" smtClean="0">
+                    <a:solidFill>
+                      <a:srgbClr val="000000"/>
+                    </a:solidFill>
+                    <a:latin typeface="Courier New" panose="02070309020205020404" pitchFamily="49" charset="0"/>
+                    <a:cs typeface="Courier New" panose="02070309020205020404" pitchFamily="49" charset="0"/>
+                  </a:rPr>
+                  <a:t>(</a:t>
+                </a:r>
+                <a:r>
+                  <a:rPr lang="en-US" sz="1200" i="1" dirty="0" err="1" smtClean="0">
+                    <a:solidFill>
+                      <a:srgbClr val="000000"/>
+                    </a:solidFill>
+                    <a:latin typeface="Courier New" panose="02070309020205020404" pitchFamily="49" charset="0"/>
+                    <a:cs typeface="Courier New" panose="02070309020205020404" pitchFamily="49" charset="0"/>
+                  </a:rPr>
+                  <a:t>selected_row</a:t>
+                </a:r>
+                <a:r>
+                  <a:rPr lang="en-US" sz="1200" i="1" dirty="0">
+                    <a:solidFill>
+                      <a:srgbClr val="000000"/>
+                    </a:solidFill>
+                    <a:latin typeface="Courier New" panose="02070309020205020404" pitchFamily="49" charset="0"/>
+                    <a:cs typeface="Courier New" panose="02070309020205020404" pitchFamily="49" charset="0"/>
+                  </a:rPr>
+                  <a:t>, </a:t>
+                </a:r>
+                <a:r>
+                  <a:rPr lang="en-US" sz="1200" i="1" dirty="0" err="1">
+                    <a:solidFill>
+                      <a:srgbClr val="000000"/>
+                    </a:solidFill>
+                    <a:latin typeface="Courier New" panose="02070309020205020404" pitchFamily="49" charset="0"/>
+                    <a:cs typeface="Courier New" panose="02070309020205020404" pitchFamily="49" charset="0"/>
+                  </a:rPr>
+                  <a:t>selected_column</a:t>
+                </a:r>
+                <a:r>
+                  <a:rPr lang="en-US" sz="1200" i="1" dirty="0">
+                    <a:solidFill>
+                      <a:srgbClr val="000000"/>
+                    </a:solidFill>
+                    <a:latin typeface="Courier New" panose="02070309020205020404" pitchFamily="49" charset="0"/>
+                    <a:cs typeface="Courier New" panose="02070309020205020404" pitchFamily="49" charset="0"/>
+                  </a:rPr>
+                  <a:t>)</a:t>
+                </a:r>
+                <a:endParaRPr lang="en-US" sz="1200" i="1" dirty="0" smtClean="0">
+                  <a:solidFill>
+                    <a:srgbClr val="000000"/>
+                  </a:solidFill>
+                  <a:latin typeface="Courier New" panose="02070309020205020404" pitchFamily="49" charset="0"/>
+                  <a:cs typeface="Courier New" panose="02070309020205020404" pitchFamily="49" charset="0"/>
+                </a:endParaRPr>
+              </a:p>
+              <a:p>
+                <a:endParaRPr lang="en-US" sz="1200" dirty="0">
+                  <a:solidFill>
+                    <a:srgbClr val="000000"/>
+                  </a:solidFill>
+                  <a:latin typeface="Courier New" panose="02070309020205020404" pitchFamily="49" charset="0"/>
+                  <a:cs typeface="Courier New" panose="02070309020205020404" pitchFamily="49" charset="0"/>
+                </a:endParaRPr>
+              </a:p>
+              <a:p>
+                <a:r>
+                  <a:rPr lang="en-US" sz="1200" b="1" dirty="0" smtClean="0">
+                    <a:solidFill>
+                      <a:srgbClr val="000000"/>
+                    </a:solidFill>
+                    <a:latin typeface="Courier New" panose="02070309020205020404" pitchFamily="49" charset="0"/>
+                    <a:cs typeface="Courier New" panose="02070309020205020404" pitchFamily="49" charset="0"/>
+                  </a:rPr>
+                  <a:t>return </a:t>
+                </a:r>
+                <a:r>
+                  <a:rPr lang="en-US" sz="1200" dirty="0" err="1" smtClean="0">
+                    <a:solidFill>
+                      <a:srgbClr val="000000"/>
+                    </a:solidFill>
+                    <a:latin typeface="Courier New" panose="02070309020205020404" pitchFamily="49" charset="0"/>
+                    <a:cs typeface="Courier New" panose="02070309020205020404" pitchFamily="49" charset="0"/>
+                  </a:rPr>
+                  <a:t>st.answer</a:t>
+                </a:r>
+                <a:r>
+                  <a:rPr lang="en-US" sz="1200" dirty="0" smtClean="0">
+                    <a:solidFill>
+                      <a:srgbClr val="000000"/>
+                    </a:solidFill>
+                    <a:latin typeface="Courier New" panose="02070309020205020404" pitchFamily="49" charset="0"/>
+                    <a:cs typeface="Courier New" panose="02070309020205020404" pitchFamily="49" charset="0"/>
+                  </a:rPr>
+                  <a:t>()</a:t>
+                </a:r>
+              </a:p>
+            </p:txBody>
+          </p:sp>
+        </mc:Choice>
+        <mc:Fallback>
+          <p:sp>
+            <p:nvSpPr>
+              <p:cNvPr id="2" name="Title 1">
+                <a:extLst>
+                  <a:ext uri="{FF2B5EF4-FFF2-40B4-BE49-F238E27FC236}">
+                    <a16:creationId xmlns="" xmlns:a16="http://schemas.microsoft.com/office/drawing/2014/main" id="{D6D020BA-2777-45DF-873F-47F8AD7560C2}"/>
+                  </a:ext>
+                </a:extLst>
+              </p:cNvPr>
+              <p:cNvSpPr txBox="1">
+                <a:spLocks noRot="1" noChangeAspect="1" noMove="1" noResize="1" noEditPoints="1" noAdjustHandles="1" noChangeArrowheads="1" noChangeShapeType="1" noTextEdit="1"/>
+              </p:cNvSpPr>
+              <p:nvPr/>
+            </p:nvSpPr>
+            <p:spPr>
+              <a:xfrm>
+                <a:off x="90714" y="400692"/>
+                <a:ext cx="8919722" cy="4058292"/>
+              </a:xfrm>
+              <a:prstGeom prst="rect">
+                <a:avLst/>
+              </a:prstGeom>
+              <a:blipFill rotWithShape="0">
+                <a:blip r:embed="rId3"/>
+                <a:stretch>
+                  <a:fillRect l="-137" b="-1353"/>
+                </a:stretch>
+              </a:blipFill>
+            </p:spPr>
+            <p:txBody>
+              <a:bodyPr/>
+              <a:lstStyle/>
+              <a:p>
+                <a:r>
+                  <a:rPr lang="ru-RU">
+                    <a:noFill/>
+                  </a:rPr>
+                  <a:t> </a:t>
+                </a:r>
+              </a:p>
+            </p:txBody>
+          </p:sp>
+        </mc:Fallback>
+      </mc:AlternateContent>
     </p:spTree>
     <p:extLst>
       <p:ext uri="{BB962C8B-B14F-4D97-AF65-F5344CB8AC3E}">
@@ -7351,7 +8077,7 @@
           <p:cNvPr id="6" name="Title 1">
             <a:extLst>
               <a:ext uri="{FF2B5EF4-FFF2-40B4-BE49-F238E27FC236}">
-                <a16:creationId xmlns:a16="http://schemas.microsoft.com/office/drawing/2014/main" xmlns="" id="{290FAFEE-B028-44A8-8F57-9D774A87E2B5}"/>
+                <a16:creationId xmlns="" xmlns:a16="http://schemas.microsoft.com/office/drawing/2014/main" id="{290FAFEE-B028-44A8-8F57-9D774A87E2B5}"/>
               </a:ext>
             </a:extLst>
           </p:cNvPr>
@@ -7397,7 +8123,7 @@
               <p:cNvPr id="2" name="Title 1">
                 <a:extLst>
                   <a:ext uri="{FF2B5EF4-FFF2-40B4-BE49-F238E27FC236}">
-                    <a16:creationId xmlns:a16="http://schemas.microsoft.com/office/drawing/2014/main" xmlns="" id="{D6D020BA-2777-45DF-873F-47F8AD7560C2}"/>
+                    <a16:creationId xmlns="" xmlns:a16="http://schemas.microsoft.com/office/drawing/2014/main" id="{D6D020BA-2777-45DF-873F-47F8AD7560C2}"/>
                   </a:ext>
                 </a:extLst>
               </p:cNvPr>
@@ -8093,7 +8819,27 @@
                     <a:latin typeface="Courier New" panose="02070309020205020404" pitchFamily="49" charset="0"/>
                     <a:cs typeface="Courier New" panose="02070309020205020404" pitchFamily="49" charset="0"/>
                   </a:rPr>
-                  <a:t> where </a:t>
+                  <a:t> </a:t>
+                </a:r>
+                <a:r>
+                  <a:rPr lang="en-US" sz="1150" b="1" dirty="0" smtClean="0">
+                    <a:solidFill>
+                      <a:srgbClr val="000000"/>
+                    </a:solidFill>
+                    <a:latin typeface="Courier New" panose="02070309020205020404" pitchFamily="49" charset="0"/>
+                    <a:cs typeface="Courier New" panose="02070309020205020404" pitchFamily="49" charset="0"/>
+                  </a:rPr>
+                  <a:t>where</a:t>
+                </a:r>
+                <a:r>
+                  <a:rPr lang="en-US" sz="1150" i="1" dirty="0" smtClean="0">
+                    <a:solidFill>
+                      <a:srgbClr val="000000"/>
+                    </a:solidFill>
+                    <a:latin typeface="Courier New" panose="02070309020205020404" pitchFamily="49" charset="0"/>
+                    <a:cs typeface="Courier New" panose="02070309020205020404" pitchFamily="49" charset="0"/>
+                  </a:rPr>
+                  <a:t> </a:t>
                 </a:r>
                 <a14:m>
                   <m:oMath xmlns:m="http://schemas.openxmlformats.org/officeDocument/2006/math">
@@ -8837,6 +9583,16 @@
                   <a:t> </a:t>
                 </a:r>
                 <a:r>
+                  <a:rPr lang="en-US" sz="1150" b="1" dirty="0">
+                    <a:solidFill>
+                      <a:srgbClr val="000000"/>
+                    </a:solidFill>
+                    <a:latin typeface="Courier New" panose="02070309020205020404" pitchFamily="49" charset="0"/>
+                    <a:cs typeface="Courier New" panose="02070309020205020404" pitchFamily="49" charset="0"/>
+                  </a:rPr>
+                  <a:t>where</a:t>
+                </a:r>
+                <a:r>
                   <a:rPr lang="en-US" sz="1150" i="1" dirty="0">
                     <a:solidFill>
                       <a:srgbClr val="000000"/>
@@ -8844,7 +9600,7 @@
                     <a:latin typeface="Courier New" panose="02070309020205020404" pitchFamily="49" charset="0"/>
                     <a:cs typeface="Courier New" panose="02070309020205020404" pitchFamily="49" charset="0"/>
                   </a:rPr>
-                  <a:t>where </a:t>
+                  <a:t> </a:t>
                 </a:r>
                 <a14:m>
                   <m:oMath xmlns:m="http://schemas.openxmlformats.org/officeDocument/2006/math">
@@ -9422,6 +10178,16 @@
                   <a:t> </a:t>
                 </a:r>
                 <a:r>
+                  <a:rPr lang="en-US" sz="1150" b="1" dirty="0">
+                    <a:solidFill>
+                      <a:srgbClr val="000000"/>
+                    </a:solidFill>
+                    <a:latin typeface="Courier New" panose="02070309020205020404" pitchFamily="49" charset="0"/>
+                    <a:cs typeface="Courier New" panose="02070309020205020404" pitchFamily="49" charset="0"/>
+                  </a:rPr>
+                  <a:t>where</a:t>
+                </a:r>
+                <a:r>
                   <a:rPr lang="en-US" sz="1150" i="1" dirty="0">
                     <a:solidFill>
                       <a:srgbClr val="000000"/>
@@ -9429,7 +10195,7 @@
                     <a:latin typeface="Courier New" panose="02070309020205020404" pitchFamily="49" charset="0"/>
                     <a:cs typeface="Courier New" panose="02070309020205020404" pitchFamily="49" charset="0"/>
                   </a:rPr>
-                  <a:t>where </a:t>
+                  <a:t> </a:t>
                 </a:r>
                 <a14:m>
                   <m:oMath xmlns:m="http://schemas.openxmlformats.org/officeDocument/2006/math">
@@ -10388,7 +11154,7 @@
               <p:cNvPr id="2" name="Title 1">
                 <a:extLst>
                   <a:ext uri="{FF2B5EF4-FFF2-40B4-BE49-F238E27FC236}">
-                    <a16:creationId xmlns:a16="http://schemas.microsoft.com/office/drawing/2014/main" xmlns="" id="{D6D020BA-2777-45DF-873F-47F8AD7560C2}"/>
+                    <a16:creationId xmlns="" xmlns:a16="http://schemas.microsoft.com/office/drawing/2014/main" xmlns:a14="http://schemas.microsoft.com/office/drawing/2010/main" id="{D6D020BA-2777-45DF-873F-47F8AD7560C2}"/>
                   </a:ext>
                 </a:extLst>
               </p:cNvPr>
@@ -10462,7 +11228,7 @@
           <p:cNvPr id="6" name="Title 1">
             <a:extLst>
               <a:ext uri="{FF2B5EF4-FFF2-40B4-BE49-F238E27FC236}">
-                <a16:creationId xmlns:a16="http://schemas.microsoft.com/office/drawing/2014/main" xmlns="" id="{290FAFEE-B028-44A8-8F57-9D774A87E2B5}"/>
+                <a16:creationId xmlns="" xmlns:a16="http://schemas.microsoft.com/office/drawing/2014/main" id="{290FAFEE-B028-44A8-8F57-9D774A87E2B5}"/>
               </a:ext>
             </a:extLst>
           </p:cNvPr>
@@ -10501,14 +11267,14 @@
           </a:p>
         </p:txBody>
       </p:sp>
-      <mc:AlternateContent xmlns:mc="http://schemas.openxmlformats.org/markup-compatibility/2006">
-        <mc:Choice xmlns:a14="http://schemas.microsoft.com/office/drawing/2010/main" Requires="a14">
+      <mc:AlternateContent xmlns:mc="http://schemas.openxmlformats.org/markup-compatibility/2006" xmlns:a14="http://schemas.microsoft.com/office/drawing/2010/main">
+        <mc:Choice Requires="a14">
           <p:sp>
             <p:nvSpPr>
               <p:cNvPr id="2" name="Title 1">
                 <a:extLst>
                   <a:ext uri="{FF2B5EF4-FFF2-40B4-BE49-F238E27FC236}">
-                    <a16:creationId xmlns:a16="http://schemas.microsoft.com/office/drawing/2014/main" xmlns="" id="{D6D020BA-2777-45DF-873F-47F8AD7560C2}"/>
+                    <a16:creationId xmlns="" xmlns:a16="http://schemas.microsoft.com/office/drawing/2014/main" id="{D6D020BA-2777-45DF-873F-47F8AD7560C2}"/>
                   </a:ext>
                 </a:extLst>
               </p:cNvPr>
@@ -10983,7 +11749,7 @@
             </p:txBody>
           </p:sp>
         </mc:Choice>
-        <mc:Fallback>
+        <mc:Fallback xmlns="">
           <p:sp>
             <p:nvSpPr>
               <p:cNvPr id="2" name="Title 1">
@@ -11063,7 +11829,7 @@
           <p:cNvPr id="6" name="Title 1">
             <a:extLst>
               <a:ext uri="{FF2B5EF4-FFF2-40B4-BE49-F238E27FC236}">
-                <a16:creationId xmlns:a16="http://schemas.microsoft.com/office/drawing/2014/main" xmlns="" id="{290FAFEE-B028-44A8-8F57-9D774A87E2B5}"/>
+                <a16:creationId xmlns="" xmlns:a16="http://schemas.microsoft.com/office/drawing/2014/main" id="{290FAFEE-B028-44A8-8F57-9D774A87E2B5}"/>
               </a:ext>
             </a:extLst>
           </p:cNvPr>
@@ -11107,7 +11873,7 @@
           <p:cNvPr id="2" name="Title 1">
             <a:extLst>
               <a:ext uri="{FF2B5EF4-FFF2-40B4-BE49-F238E27FC236}">
-                <a16:creationId xmlns:a16="http://schemas.microsoft.com/office/drawing/2014/main" xmlns="" id="{1CC35EA4-EA8F-41C2-B782-26AFCEB2EAF3}"/>
+                <a16:creationId xmlns="" xmlns:a16="http://schemas.microsoft.com/office/drawing/2014/main" id="{1CC35EA4-EA8F-41C2-B782-26AFCEB2EAF3}"/>
               </a:ext>
             </a:extLst>
           </p:cNvPr>
@@ -11191,7 +11957,7 @@
           <p:cNvPr id="7" name="Title 1">
             <a:extLst>
               <a:ext uri="{FF2B5EF4-FFF2-40B4-BE49-F238E27FC236}">
-                <a16:creationId xmlns:a16="http://schemas.microsoft.com/office/drawing/2014/main" xmlns="" id="{1CC35EA4-EA8F-41C2-B782-26AFCEB2EAF3}"/>
+                <a16:creationId xmlns="" xmlns:a16="http://schemas.microsoft.com/office/drawing/2014/main" id="{1CC35EA4-EA8F-41C2-B782-26AFCEB2EAF3}"/>
               </a:ext>
             </a:extLst>
           </p:cNvPr>
@@ -11251,7 +12017,7 @@
           <p:cNvPr id="8" name="Title 1">
             <a:extLst>
               <a:ext uri="{FF2B5EF4-FFF2-40B4-BE49-F238E27FC236}">
-                <a16:creationId xmlns:a16="http://schemas.microsoft.com/office/drawing/2014/main" xmlns="" id="{1CC35EA4-EA8F-41C2-B782-26AFCEB2EAF3}"/>
+                <a16:creationId xmlns="" xmlns:a16="http://schemas.microsoft.com/office/drawing/2014/main" id="{1CC35EA4-EA8F-41C2-B782-26AFCEB2EAF3}"/>
               </a:ext>
             </a:extLst>
           </p:cNvPr>
@@ -11319,7 +12085,7 @@
           <p:cNvPr id="9" name="Title 1">
             <a:extLst>
               <a:ext uri="{FF2B5EF4-FFF2-40B4-BE49-F238E27FC236}">
-                <a16:creationId xmlns:a16="http://schemas.microsoft.com/office/drawing/2014/main" xmlns="" id="{1CC35EA4-EA8F-41C2-B782-26AFCEB2EAF3}"/>
+                <a16:creationId xmlns="" xmlns:a16="http://schemas.microsoft.com/office/drawing/2014/main" id="{1CC35EA4-EA8F-41C2-B782-26AFCEB2EAF3}"/>
               </a:ext>
             </a:extLst>
           </p:cNvPr>
@@ -11553,7 +12319,7 @@
           <p:cNvPr id="6" name="Title 1">
             <a:extLst>
               <a:ext uri="{FF2B5EF4-FFF2-40B4-BE49-F238E27FC236}">
-                <a16:creationId xmlns:a16="http://schemas.microsoft.com/office/drawing/2014/main" xmlns="" id="{290FAFEE-B028-44A8-8F57-9D774A87E2B5}"/>
+                <a16:creationId xmlns="" xmlns:a16="http://schemas.microsoft.com/office/drawing/2014/main" id="{290FAFEE-B028-44A8-8F57-9D774A87E2B5}"/>
               </a:ext>
             </a:extLst>
           </p:cNvPr>
@@ -11597,7 +12363,7 @@
           <p:cNvPr id="2" name="Title 1">
             <a:extLst>
               <a:ext uri="{FF2B5EF4-FFF2-40B4-BE49-F238E27FC236}">
-                <a16:creationId xmlns:a16="http://schemas.microsoft.com/office/drawing/2014/main" xmlns="" id="{1CC35EA4-EA8F-41C2-B782-26AFCEB2EAF3}"/>
+                <a16:creationId xmlns="" xmlns:a16="http://schemas.microsoft.com/office/drawing/2014/main" id="{1CC35EA4-EA8F-41C2-B782-26AFCEB2EAF3}"/>
               </a:ext>
             </a:extLst>
           </p:cNvPr>
@@ -11657,7 +12423,7 @@
           <p:cNvPr id="7" name="Title 1">
             <a:extLst>
               <a:ext uri="{FF2B5EF4-FFF2-40B4-BE49-F238E27FC236}">
-                <a16:creationId xmlns:a16="http://schemas.microsoft.com/office/drawing/2014/main" xmlns="" id="{1CC35EA4-EA8F-41C2-B782-26AFCEB2EAF3}"/>
+                <a16:creationId xmlns="" xmlns:a16="http://schemas.microsoft.com/office/drawing/2014/main" id="{1CC35EA4-EA8F-41C2-B782-26AFCEB2EAF3}"/>
               </a:ext>
             </a:extLst>
           </p:cNvPr>
@@ -11717,7 +12483,7 @@
           <p:cNvPr id="8" name="Title 1">
             <a:extLst>
               <a:ext uri="{FF2B5EF4-FFF2-40B4-BE49-F238E27FC236}">
-                <a16:creationId xmlns:a16="http://schemas.microsoft.com/office/drawing/2014/main" xmlns="" id="{1CC35EA4-EA8F-41C2-B782-26AFCEB2EAF3}"/>
+                <a16:creationId xmlns="" xmlns:a16="http://schemas.microsoft.com/office/drawing/2014/main" id="{1CC35EA4-EA8F-41C2-B782-26AFCEB2EAF3}"/>
               </a:ext>
             </a:extLst>
           </p:cNvPr>
@@ -11785,7 +12551,7 @@
           <p:cNvPr id="9" name="Title 1">
             <a:extLst>
               <a:ext uri="{FF2B5EF4-FFF2-40B4-BE49-F238E27FC236}">
-                <a16:creationId xmlns:a16="http://schemas.microsoft.com/office/drawing/2014/main" xmlns="" id="{1CC35EA4-EA8F-41C2-B782-26AFCEB2EAF3}"/>
+                <a16:creationId xmlns="" xmlns:a16="http://schemas.microsoft.com/office/drawing/2014/main" id="{1CC35EA4-EA8F-41C2-B782-26AFCEB2EAF3}"/>
               </a:ext>
             </a:extLst>
           </p:cNvPr>
@@ -11947,7 +12713,7 @@
           <p:cNvPr id="6" name="Title 1">
             <a:extLst>
               <a:ext uri="{FF2B5EF4-FFF2-40B4-BE49-F238E27FC236}">
-                <a16:creationId xmlns:a16="http://schemas.microsoft.com/office/drawing/2014/main" xmlns="" id="{290FAFEE-B028-44A8-8F57-9D774A87E2B5}"/>
+                <a16:creationId xmlns="" xmlns:a16="http://schemas.microsoft.com/office/drawing/2014/main" id="{290FAFEE-B028-44A8-8F57-9D774A87E2B5}"/>
               </a:ext>
             </a:extLst>
           </p:cNvPr>
@@ -11971,6 +12737,818 @@
           <a:lstStyle/>
           <a:p>
             <a:r>
+              <a:rPr lang="ru-RU" sz="2500" b="1" dirty="0" smtClean="0">
+                <a:solidFill>
+                  <a:srgbClr val="0230AC"/>
+                </a:solidFill>
+              </a:rPr>
+              <a:t>Задача о банке</a:t>
+            </a:r>
+            <a:endParaRPr lang="en-US" sz="2500" b="1" dirty="0">
+              <a:solidFill>
+                <a:srgbClr val="0230AC"/>
+              </a:solidFill>
+            </a:endParaRPr>
+          </a:p>
+        </p:txBody>
+      </p:sp>
+      <p:sp>
+        <p:nvSpPr>
+          <p:cNvPr id="9" name="Title 1">
+            <a:extLst>
+              <a:ext uri="{FF2B5EF4-FFF2-40B4-BE49-F238E27FC236}">
+                <a16:creationId xmlns="" xmlns:a16="http://schemas.microsoft.com/office/drawing/2014/main" id="{1CC35EA4-EA8F-41C2-B782-26AFCEB2EAF3}"/>
+              </a:ext>
+            </a:extLst>
+          </p:cNvPr>
+          <p:cNvSpPr txBox="1">
+            <a:spLocks/>
+          </p:cNvSpPr>
+          <p:nvPr/>
+        </p:nvSpPr>
+        <p:spPr>
+          <a:xfrm>
+            <a:off x="154631" y="514156"/>
+            <a:ext cx="5896847" cy="1992738"/>
+          </a:xfrm>
+          <a:prstGeom prst="rect">
+            <a:avLst/>
+          </a:prstGeom>
+        </p:spPr>
+        <p:txBody>
+          <a:bodyPr vert="horz" lIns="91440" tIns="45720" rIns="91440" bIns="45720" rtlCol="0" anchor="b">
+            <a:normAutofit fontScale="70000" lnSpcReduction="20000"/>
+          </a:bodyPr>
+          <a:lstStyle>
+            <a:lvl1pPr algn="l" defTabSz="457200" rtl="0" eaLnBrk="1" latinLnBrk="0" hangingPunct="1">
+              <a:spcBef>
+                <a:spcPct val="0"/>
+              </a:spcBef>
+              <a:buNone/>
+              <a:defRPr sz="3200" b="0" i="0" kern="1200" baseline="0">
+                <a:solidFill>
+                  <a:schemeClr val="tx1"/>
+                </a:solidFill>
+                <a:latin typeface="+mj-lt"/>
+                <a:ea typeface="+mj-ea"/>
+                <a:cs typeface="+mj-cs"/>
+              </a:defRPr>
+            </a:lvl1pPr>
+          </a:lstStyle>
+          <a:p>
+            <a:r>
+              <a:rPr lang="ru-RU" sz="1600" dirty="0" err="1">
+                <a:solidFill>
+                  <a:srgbClr val="000000"/>
+                </a:solidFill>
+              </a:rPr>
+              <a:t>Cобственные</a:t>
+            </a:r>
+            <a:r>
+              <a:rPr lang="ru-RU" sz="1600" dirty="0">
+                <a:solidFill>
+                  <a:srgbClr val="000000"/>
+                </a:solidFill>
+              </a:rPr>
+              <a:t> средства банка в сумме с депозитами </a:t>
+            </a:r>
+            <a:r>
+              <a:rPr lang="ru-RU" sz="1600" dirty="0" smtClean="0">
+                <a:solidFill>
+                  <a:srgbClr val="000000"/>
+                </a:solidFill>
+              </a:rPr>
+              <a:t>составляют</a:t>
+            </a:r>
+            <a:r>
+              <a:rPr lang="en-US" sz="1600" dirty="0" smtClean="0">
+                <a:solidFill>
+                  <a:srgbClr val="000000"/>
+                </a:solidFill>
+              </a:rPr>
+              <a:t> </a:t>
+            </a:r>
+            <a:r>
+              <a:rPr lang="ru-RU" sz="1600" dirty="0" smtClean="0">
+                <a:solidFill>
+                  <a:srgbClr val="000000"/>
+                </a:solidFill>
+              </a:rPr>
+              <a:t>100 </a:t>
+            </a:r>
+            <a:r>
+              <a:rPr lang="ru-RU" sz="1600" dirty="0">
+                <a:solidFill>
+                  <a:srgbClr val="000000"/>
+                </a:solidFill>
+              </a:rPr>
+              <a:t>млн. долл. Часть этих средств, но не менее 35 млн. </a:t>
+            </a:r>
+            <a:r>
+              <a:rPr lang="ru-RU" sz="1600" dirty="0" smtClean="0">
+                <a:solidFill>
+                  <a:srgbClr val="000000"/>
+                </a:solidFill>
+              </a:rPr>
+              <a:t>долл.</a:t>
+            </a:r>
+            <a:r>
+              <a:rPr lang="en-US" sz="1600" dirty="0" smtClean="0">
+                <a:solidFill>
+                  <a:srgbClr val="000000"/>
+                </a:solidFill>
+              </a:rPr>
+              <a:t> </a:t>
+            </a:r>
+            <a:r>
+              <a:rPr lang="ru-RU" sz="1600" dirty="0" smtClean="0">
+                <a:solidFill>
+                  <a:srgbClr val="000000"/>
+                </a:solidFill>
+              </a:rPr>
+              <a:t>должна быть</a:t>
+            </a:r>
+            <a:r>
+              <a:rPr lang="en-US" sz="1600" dirty="0" smtClean="0">
+                <a:solidFill>
+                  <a:srgbClr val="000000"/>
+                </a:solidFill>
+              </a:rPr>
+              <a:t> </a:t>
+            </a:r>
+            <a:r>
+              <a:rPr lang="ru-RU" sz="1600" dirty="0" smtClean="0">
+                <a:solidFill>
+                  <a:srgbClr val="000000"/>
+                </a:solidFill>
+              </a:rPr>
+              <a:t>размещена </a:t>
+            </a:r>
+            <a:r>
+              <a:rPr lang="ru-RU" sz="1600" dirty="0">
+                <a:solidFill>
+                  <a:srgbClr val="000000"/>
+                </a:solidFill>
+              </a:rPr>
+              <a:t>в кредитах. Доходность кредитов с1 = 15%, а доходность ценных</a:t>
+            </a:r>
+            <a:r>
+              <a:rPr lang="en-US" sz="1600" dirty="0">
+                <a:solidFill>
+                  <a:srgbClr val="000000"/>
+                </a:solidFill>
+              </a:rPr>
+              <a:t> </a:t>
+            </a:r>
+            <a:r>
+              <a:rPr lang="ru-RU" sz="1600" dirty="0">
+                <a:solidFill>
+                  <a:srgbClr val="000000"/>
+                </a:solidFill>
+              </a:rPr>
+              <a:t>бумаг с2 = 10%.</a:t>
+            </a:r>
+            <a:endParaRPr lang="en-US" sz="1600" dirty="0">
+              <a:solidFill>
+                <a:srgbClr val="000000"/>
+              </a:solidFill>
+            </a:endParaRPr>
+          </a:p>
+          <a:p>
+            <a:endParaRPr lang="en-US" sz="1600" dirty="0" smtClean="0">
+              <a:solidFill>
+                <a:srgbClr val="000000"/>
+              </a:solidFill>
+            </a:endParaRPr>
+          </a:p>
+          <a:p>
+            <a:r>
+              <a:rPr lang="ru-RU" sz="1600" dirty="0" smtClean="0">
+                <a:solidFill>
+                  <a:srgbClr val="000000"/>
+                </a:solidFill>
+              </a:rPr>
+              <a:t>Кредиты </a:t>
+            </a:r>
+            <a:r>
+              <a:rPr lang="ru-RU" sz="1600" dirty="0">
+                <a:solidFill>
+                  <a:srgbClr val="000000"/>
+                </a:solidFill>
+              </a:rPr>
+              <a:t>являются неликвидными активами банка, </a:t>
+            </a:r>
+            <a:r>
+              <a:rPr lang="ru-RU" sz="1600" dirty="0" smtClean="0">
+                <a:solidFill>
+                  <a:srgbClr val="000000"/>
+                </a:solidFill>
+              </a:rPr>
+              <a:t>так</a:t>
+            </a:r>
+            <a:r>
+              <a:rPr lang="en-US" sz="1600" dirty="0" smtClean="0">
+                <a:solidFill>
+                  <a:srgbClr val="000000"/>
+                </a:solidFill>
+              </a:rPr>
+              <a:t> </a:t>
+            </a:r>
+            <a:r>
+              <a:rPr lang="ru-RU" sz="1600" dirty="0" smtClean="0">
+                <a:solidFill>
+                  <a:srgbClr val="000000"/>
+                </a:solidFill>
+              </a:rPr>
+              <a:t>как </a:t>
+            </a:r>
+            <a:r>
+              <a:rPr lang="ru-RU" sz="1600" dirty="0">
+                <a:solidFill>
+                  <a:srgbClr val="000000"/>
+                </a:solidFill>
+              </a:rPr>
+              <a:t>в случае </a:t>
+            </a:r>
+            <a:r>
+              <a:rPr lang="ru-RU" sz="1600" dirty="0" smtClean="0">
+                <a:solidFill>
+                  <a:srgbClr val="000000"/>
+                </a:solidFill>
+              </a:rPr>
+              <a:t>непредвиденной</a:t>
+            </a:r>
+            <a:r>
+              <a:rPr lang="en-US" sz="1600" dirty="0" smtClean="0">
+                <a:solidFill>
+                  <a:srgbClr val="000000"/>
+                </a:solidFill>
+              </a:rPr>
+              <a:t> </a:t>
+            </a:r>
+            <a:r>
+              <a:rPr lang="ru-RU" sz="1600" dirty="0" smtClean="0">
+                <a:solidFill>
+                  <a:srgbClr val="000000"/>
+                </a:solidFill>
+              </a:rPr>
+              <a:t>потребности </a:t>
+            </a:r>
+            <a:r>
+              <a:rPr lang="ru-RU" sz="1600" dirty="0">
+                <a:solidFill>
+                  <a:srgbClr val="000000"/>
+                </a:solidFill>
+              </a:rPr>
+              <a:t>в наличность обратить кредиты </a:t>
+            </a:r>
+            <a:r>
+              <a:rPr lang="ru-RU" sz="1600" dirty="0" smtClean="0">
+                <a:solidFill>
+                  <a:srgbClr val="000000"/>
+                </a:solidFill>
+              </a:rPr>
+              <a:t>в</a:t>
+            </a:r>
+            <a:r>
+              <a:rPr lang="en-US" sz="1600" dirty="0" smtClean="0">
+                <a:solidFill>
+                  <a:srgbClr val="000000"/>
+                </a:solidFill>
+              </a:rPr>
+              <a:t> </a:t>
+            </a:r>
+            <a:r>
+              <a:rPr lang="ru-RU" sz="1600" dirty="0" smtClean="0">
+                <a:solidFill>
+                  <a:srgbClr val="000000"/>
+                </a:solidFill>
+              </a:rPr>
+              <a:t>деньги </a:t>
+            </a:r>
+            <a:r>
+              <a:rPr lang="ru-RU" sz="1600" dirty="0">
+                <a:solidFill>
+                  <a:srgbClr val="000000"/>
+                </a:solidFill>
+              </a:rPr>
+              <a:t>без существенных потерь </a:t>
+            </a:r>
+            <a:r>
+              <a:rPr lang="ru-RU" sz="1600" dirty="0" smtClean="0">
+                <a:solidFill>
+                  <a:srgbClr val="000000"/>
+                </a:solidFill>
+              </a:rPr>
+              <a:t>невозможно.</a:t>
+            </a:r>
+            <a:r>
+              <a:rPr lang="en-US" sz="1600" dirty="0">
+                <a:solidFill>
+                  <a:srgbClr val="000000"/>
+                </a:solidFill>
+              </a:rPr>
+              <a:t> </a:t>
+            </a:r>
+            <a:r>
+              <a:rPr lang="ru-RU" sz="1600" dirty="0" smtClean="0">
+                <a:solidFill>
+                  <a:srgbClr val="000000"/>
+                </a:solidFill>
+              </a:rPr>
+              <a:t>Другое </a:t>
+            </a:r>
+            <a:r>
+              <a:rPr lang="ru-RU" sz="1600" dirty="0">
+                <a:solidFill>
+                  <a:srgbClr val="000000"/>
+                </a:solidFill>
+              </a:rPr>
+              <a:t>дело ценные бумаги (особенно государственные). Их можно </a:t>
+            </a:r>
+            <a:r>
+              <a:rPr lang="ru-RU" sz="1600" dirty="0" smtClean="0">
+                <a:solidFill>
+                  <a:srgbClr val="000000"/>
+                </a:solidFill>
+              </a:rPr>
+              <a:t>в</a:t>
+            </a:r>
+            <a:r>
+              <a:rPr lang="en-US" sz="1600" dirty="0" smtClean="0">
+                <a:solidFill>
+                  <a:srgbClr val="000000"/>
+                </a:solidFill>
+              </a:rPr>
+              <a:t> </a:t>
+            </a:r>
+            <a:r>
+              <a:rPr lang="ru-RU" sz="1600" dirty="0" smtClean="0">
+                <a:solidFill>
+                  <a:srgbClr val="000000"/>
+                </a:solidFill>
+              </a:rPr>
+              <a:t>любой </a:t>
+            </a:r>
+            <a:r>
+              <a:rPr lang="ru-RU" sz="1600" dirty="0">
+                <a:solidFill>
+                  <a:srgbClr val="000000"/>
+                </a:solidFill>
+              </a:rPr>
+              <a:t>момент подать, получив некоторую прибыль, или, во всяком случае, </a:t>
+            </a:r>
+            <a:r>
+              <a:rPr lang="ru-RU" sz="1600" dirty="0" smtClean="0">
+                <a:solidFill>
+                  <a:srgbClr val="000000"/>
+                </a:solidFill>
+              </a:rPr>
+              <a:t>без</a:t>
+            </a:r>
+            <a:r>
+              <a:rPr lang="en-US" sz="1600" dirty="0" smtClean="0">
+                <a:solidFill>
+                  <a:srgbClr val="000000"/>
+                </a:solidFill>
+              </a:rPr>
+              <a:t> </a:t>
+            </a:r>
+            <a:r>
+              <a:rPr lang="ru-RU" sz="1600" dirty="0" smtClean="0">
+                <a:solidFill>
+                  <a:srgbClr val="000000"/>
+                </a:solidFill>
+              </a:rPr>
+              <a:t>большого убытка. Поэтому существует правило, согласно которому</a:t>
+            </a:r>
+            <a:r>
+              <a:rPr lang="en-US" sz="1600" dirty="0" smtClean="0">
+                <a:solidFill>
+                  <a:srgbClr val="000000"/>
+                </a:solidFill>
+              </a:rPr>
+              <a:t> </a:t>
+            </a:r>
+            <a:r>
+              <a:rPr lang="ru-RU" sz="1600" dirty="0" smtClean="0">
+                <a:solidFill>
+                  <a:srgbClr val="000000"/>
+                </a:solidFill>
+              </a:rPr>
+              <a:t>коммерческие </a:t>
+            </a:r>
+            <a:r>
+              <a:rPr lang="ru-RU" sz="1600" dirty="0">
+                <a:solidFill>
+                  <a:srgbClr val="000000"/>
+                </a:solidFill>
+              </a:rPr>
+              <a:t>банки должны покупать в определенной пропорции </a:t>
+            </a:r>
+            <a:r>
+              <a:rPr lang="ru-RU" sz="1600" dirty="0" smtClean="0">
+                <a:solidFill>
+                  <a:srgbClr val="000000"/>
+                </a:solidFill>
+              </a:rPr>
+              <a:t>ликвидные</a:t>
+            </a:r>
+            <a:r>
+              <a:rPr lang="en-US" sz="1600" dirty="0" smtClean="0">
+                <a:solidFill>
+                  <a:srgbClr val="000000"/>
+                </a:solidFill>
+              </a:rPr>
+              <a:t> </a:t>
+            </a:r>
+            <a:r>
+              <a:rPr lang="ru-RU" sz="1600" dirty="0" smtClean="0">
+                <a:solidFill>
+                  <a:srgbClr val="000000"/>
+                </a:solidFill>
+              </a:rPr>
+              <a:t>активы </a:t>
+            </a:r>
+            <a:r>
+              <a:rPr lang="ru-RU" sz="1600" dirty="0">
+                <a:solidFill>
+                  <a:srgbClr val="000000"/>
+                </a:solidFill>
+              </a:rPr>
+              <a:t>– ценные бумаги, чтобы компенсировать </a:t>
+            </a:r>
+            <a:r>
+              <a:rPr lang="ru-RU" sz="1600" dirty="0" err="1">
+                <a:solidFill>
+                  <a:srgbClr val="000000"/>
+                </a:solidFill>
+              </a:rPr>
+              <a:t>неликвидность</a:t>
+            </a:r>
+            <a:r>
+              <a:rPr lang="ru-RU" sz="1600" dirty="0">
+                <a:solidFill>
+                  <a:srgbClr val="000000"/>
+                </a:solidFill>
+              </a:rPr>
+              <a:t> кредитов. </a:t>
+            </a:r>
+            <a:r>
+              <a:rPr lang="ru-RU" sz="1600" dirty="0" smtClean="0">
+                <a:solidFill>
+                  <a:srgbClr val="000000"/>
+                </a:solidFill>
+              </a:rPr>
+              <a:t>В</a:t>
+            </a:r>
+            <a:r>
+              <a:rPr lang="en-US" sz="1600" dirty="0" smtClean="0">
+                <a:solidFill>
+                  <a:srgbClr val="000000"/>
+                </a:solidFill>
+              </a:rPr>
+              <a:t> </a:t>
+            </a:r>
+            <a:r>
+              <a:rPr lang="ru-RU" sz="1600" dirty="0" smtClean="0">
+                <a:solidFill>
+                  <a:srgbClr val="000000"/>
+                </a:solidFill>
+              </a:rPr>
+              <a:t>нашем </a:t>
+            </a:r>
+            <a:r>
+              <a:rPr lang="ru-RU" sz="1600" dirty="0">
+                <a:solidFill>
+                  <a:srgbClr val="000000"/>
+                </a:solidFill>
+              </a:rPr>
+              <a:t>примере ликвидное ограничение таково: ценные бумаги </a:t>
+            </a:r>
+            <a:r>
+              <a:rPr lang="ru-RU" sz="1600" dirty="0" smtClean="0">
+                <a:solidFill>
+                  <a:srgbClr val="000000"/>
+                </a:solidFill>
+              </a:rPr>
+              <a:t>должны</a:t>
+            </a:r>
+            <a:r>
+              <a:rPr lang="en-US" sz="1600" dirty="0" smtClean="0">
+                <a:solidFill>
+                  <a:srgbClr val="000000"/>
+                </a:solidFill>
+              </a:rPr>
+              <a:t> </a:t>
+            </a:r>
+            <a:r>
+              <a:rPr lang="ru-RU" sz="1600" dirty="0" smtClean="0">
+                <a:solidFill>
+                  <a:srgbClr val="000000"/>
+                </a:solidFill>
+              </a:rPr>
+              <a:t>составлять </a:t>
+            </a:r>
+            <a:r>
+              <a:rPr lang="ru-RU" sz="1600" dirty="0">
+                <a:solidFill>
+                  <a:srgbClr val="000000"/>
+                </a:solidFill>
+              </a:rPr>
+              <a:t>не менее 30% средств, размещенных в кредитах и </a:t>
+            </a:r>
+            <a:r>
+              <a:rPr lang="ru-RU" sz="1600" dirty="0" smtClean="0">
+                <a:solidFill>
+                  <a:srgbClr val="000000"/>
+                </a:solidFill>
+              </a:rPr>
+              <a:t>ценных</a:t>
+            </a:r>
+            <a:r>
+              <a:rPr lang="en-US" sz="1600" dirty="0" smtClean="0">
+                <a:solidFill>
+                  <a:srgbClr val="000000"/>
+                </a:solidFill>
+              </a:rPr>
+              <a:t> </a:t>
+            </a:r>
+            <a:r>
+              <a:rPr lang="ru-RU" sz="1600" dirty="0" smtClean="0">
+                <a:solidFill>
+                  <a:srgbClr val="000000"/>
+                </a:solidFill>
+              </a:rPr>
+              <a:t>бумагах.</a:t>
+            </a:r>
+            <a:endParaRPr lang="en-US" sz="1600" dirty="0" smtClean="0">
+              <a:solidFill>
+                <a:srgbClr val="000000"/>
+              </a:solidFill>
+            </a:endParaRPr>
+          </a:p>
+        </p:txBody>
+      </p:sp>
+      <p:pic>
+        <p:nvPicPr>
+          <p:cNvPr id="3" name="Рисунок 2"/>
+          <p:cNvPicPr>
+            <a:picLocks noChangeAspect="1"/>
+          </p:cNvPicPr>
+          <p:nvPr/>
+        </p:nvPicPr>
+        <p:blipFill>
+          <a:blip r:embed="rId3"/>
+          <a:stretch>
+            <a:fillRect/>
+          </a:stretch>
+        </p:blipFill>
+        <p:spPr>
+          <a:xfrm>
+            <a:off x="6368549" y="1181528"/>
+            <a:ext cx="2379847" cy="1145852"/>
+          </a:xfrm>
+          <a:prstGeom prst="rect">
+            <a:avLst/>
+          </a:prstGeom>
+        </p:spPr>
+      </p:pic>
+      <p:sp>
+        <p:nvSpPr>
+          <p:cNvPr id="11" name="Title 1">
+            <a:extLst>
+              <a:ext uri="{FF2B5EF4-FFF2-40B4-BE49-F238E27FC236}">
+                <a16:creationId xmlns="" xmlns:a16="http://schemas.microsoft.com/office/drawing/2014/main" id="{1CC35EA4-EA8F-41C2-B782-26AFCEB2EAF3}"/>
+              </a:ext>
+            </a:extLst>
+          </p:cNvPr>
+          <p:cNvSpPr txBox="1">
+            <a:spLocks/>
+          </p:cNvSpPr>
+          <p:nvPr/>
+        </p:nvSpPr>
+        <p:spPr>
+          <a:xfrm>
+            <a:off x="1366981" y="2679241"/>
+            <a:ext cx="2438740" cy="277403"/>
+          </a:xfrm>
+          <a:prstGeom prst="rect">
+            <a:avLst/>
+          </a:prstGeom>
+        </p:spPr>
+        <p:txBody>
+          <a:bodyPr vert="horz" lIns="91440" tIns="45720" rIns="91440" bIns="45720" rtlCol="0" anchor="b">
+            <a:normAutofit fontScale="77500" lnSpcReduction="20000"/>
+          </a:bodyPr>
+          <a:lstStyle>
+            <a:lvl1pPr algn="l" defTabSz="457200" rtl="0" eaLnBrk="1" latinLnBrk="0" hangingPunct="1">
+              <a:spcBef>
+                <a:spcPct val="0"/>
+              </a:spcBef>
+              <a:buNone/>
+              <a:defRPr sz="3200" b="0" i="0" kern="1200" baseline="0">
+                <a:solidFill>
+                  <a:schemeClr val="tx1"/>
+                </a:solidFill>
+                <a:latin typeface="+mj-lt"/>
+                <a:ea typeface="+mj-ea"/>
+                <a:cs typeface="+mj-cs"/>
+              </a:defRPr>
+            </a:lvl1pPr>
+          </a:lstStyle>
+          <a:p>
+            <a:r>
+              <a:rPr lang="ru-RU" sz="1600" b="1" dirty="0" smtClean="0">
+                <a:solidFill>
+                  <a:srgbClr val="000000"/>
+                </a:solidFill>
+              </a:rPr>
+              <a:t>Результаты работы программы</a:t>
+            </a:r>
+            <a:endParaRPr lang="en-US" sz="1600" b="1" dirty="0">
+              <a:solidFill>
+                <a:srgbClr val="000000"/>
+              </a:solidFill>
+            </a:endParaRPr>
+          </a:p>
+        </p:txBody>
+      </p:sp>
+      <p:sp>
+        <p:nvSpPr>
+          <p:cNvPr id="12" name="Title 1">
+            <a:extLst>
+              <a:ext uri="{FF2B5EF4-FFF2-40B4-BE49-F238E27FC236}">
+                <a16:creationId xmlns="" xmlns:a16="http://schemas.microsoft.com/office/drawing/2014/main" id="{1CC35EA4-EA8F-41C2-B782-26AFCEB2EAF3}"/>
+              </a:ext>
+            </a:extLst>
+          </p:cNvPr>
+          <p:cNvSpPr txBox="1">
+            <a:spLocks/>
+          </p:cNvSpPr>
+          <p:nvPr/>
+        </p:nvSpPr>
+        <p:spPr>
+          <a:xfrm>
+            <a:off x="5119732" y="2728381"/>
+            <a:ext cx="2438740" cy="277403"/>
+          </a:xfrm>
+          <a:prstGeom prst="rect">
+            <a:avLst/>
+          </a:prstGeom>
+        </p:spPr>
+        <p:txBody>
+          <a:bodyPr vert="horz" lIns="91440" tIns="45720" rIns="91440" bIns="45720" rtlCol="0" anchor="b">
+            <a:normAutofit fontScale="77500" lnSpcReduction="20000"/>
+          </a:bodyPr>
+          <a:lstStyle>
+            <a:lvl1pPr algn="l" defTabSz="457200" rtl="0" eaLnBrk="1" latinLnBrk="0" hangingPunct="1">
+              <a:spcBef>
+                <a:spcPct val="0"/>
+              </a:spcBef>
+              <a:buNone/>
+              <a:defRPr sz="3200" b="0" i="0" kern="1200" baseline="0">
+                <a:solidFill>
+                  <a:schemeClr val="tx1"/>
+                </a:solidFill>
+                <a:latin typeface="+mj-lt"/>
+                <a:ea typeface="+mj-ea"/>
+                <a:cs typeface="+mj-cs"/>
+              </a:defRPr>
+            </a:lvl1pPr>
+          </a:lstStyle>
+          <a:p>
+            <a:r>
+              <a:rPr lang="ru-RU" sz="1600" b="1" dirty="0" smtClean="0">
+                <a:solidFill>
+                  <a:srgbClr val="000000"/>
+                </a:solidFill>
+              </a:rPr>
+              <a:t>Результаты работы решения </a:t>
+            </a:r>
+            <a:r>
+              <a:rPr lang="en-US" sz="1600" b="1" dirty="0" err="1">
+                <a:solidFill>
+                  <a:srgbClr val="000000"/>
+                </a:solidFill>
+              </a:rPr>
+              <a:t>PuLP</a:t>
+            </a:r>
+            <a:endParaRPr lang="en-US" sz="1600" b="1" dirty="0">
+              <a:solidFill>
+                <a:srgbClr val="000000"/>
+              </a:solidFill>
+            </a:endParaRPr>
+          </a:p>
+        </p:txBody>
+      </p:sp>
+      <p:pic>
+        <p:nvPicPr>
+          <p:cNvPr id="13" name="Рисунок 12"/>
+          <p:cNvPicPr>
+            <a:picLocks noChangeAspect="1"/>
+          </p:cNvPicPr>
+          <p:nvPr/>
+        </p:nvPicPr>
+        <p:blipFill>
+          <a:blip r:embed="rId4"/>
+          <a:stretch>
+            <a:fillRect/>
+          </a:stretch>
+        </p:blipFill>
+        <p:spPr>
+          <a:xfrm>
+            <a:off x="1252937" y="3096986"/>
+            <a:ext cx="2438740" cy="1209844"/>
+          </a:xfrm>
+          <a:prstGeom prst="rect">
+            <a:avLst/>
+          </a:prstGeom>
+        </p:spPr>
+      </p:pic>
+      <p:pic>
+        <p:nvPicPr>
+          <p:cNvPr id="14" name="Рисунок 13"/>
+          <p:cNvPicPr>
+            <a:picLocks noChangeAspect="1"/>
+          </p:cNvPicPr>
+          <p:nvPr/>
+        </p:nvPicPr>
+        <p:blipFill>
+          <a:blip r:embed="rId5"/>
+          <a:stretch>
+            <a:fillRect/>
+          </a:stretch>
+        </p:blipFill>
+        <p:spPr>
+          <a:xfrm>
+            <a:off x="5744574" y="3096986"/>
+            <a:ext cx="1247949" cy="1419423"/>
+          </a:xfrm>
+          <a:prstGeom prst="rect">
+            <a:avLst/>
+          </a:prstGeom>
+        </p:spPr>
+      </p:pic>
+    </p:spTree>
+    <p:extLst>
+      <p:ext uri="{BB962C8B-B14F-4D97-AF65-F5344CB8AC3E}">
+        <p14:creationId xmlns:p14="http://schemas.microsoft.com/office/powerpoint/2010/main" val="4125982541"/>
+      </p:ext>
+    </p:extLst>
+  </p:cSld>
+  <p:clrMapOvr>
+    <a:masterClrMapping/>
+  </p:clrMapOvr>
+</p:sld>
+</file>
+
+<file path=ppt/slides/slide9.xml><?xml version="1.0" encoding="utf-8"?>
+<p:sld xmlns:a="http://schemas.openxmlformats.org/drawingml/2006/main" xmlns:r="http://schemas.openxmlformats.org/officeDocument/2006/relationships" xmlns:p="http://schemas.openxmlformats.org/presentationml/2006/main">
+  <p:cSld>
+    <p:spTree>
+      <p:nvGrpSpPr>
+        <p:cNvPr id="1" name=""/>
+        <p:cNvGrpSpPr/>
+        <p:nvPr/>
+      </p:nvGrpSpPr>
+      <p:grpSpPr>
+        <a:xfrm>
+          <a:off x="0" y="0"/>
+          <a:ext cx="0" cy="0"/>
+          <a:chOff x="0" y="0"/>
+          <a:chExt cx="0" cy="0"/>
+        </a:xfrm>
+      </p:grpSpPr>
+      <p:sp>
+        <p:nvSpPr>
+          <p:cNvPr id="6" name="Title 1">
+            <a:extLst>
+              <a:ext uri="{FF2B5EF4-FFF2-40B4-BE49-F238E27FC236}">
+                <a16:creationId xmlns="" xmlns:a16="http://schemas.microsoft.com/office/drawing/2014/main" id="{290FAFEE-B028-44A8-8F57-9D774A87E2B5}"/>
+              </a:ext>
+            </a:extLst>
+          </p:cNvPr>
+          <p:cNvSpPr>
+            <a:spLocks noGrp="1"/>
+          </p:cNvSpPr>
+          <p:nvPr>
+            <p:ph type="title"/>
+          </p:nvPr>
+        </p:nvSpPr>
+        <p:spPr>
+          <a:xfrm>
+            <a:off x="0" y="61604"/>
+            <a:ext cx="8745054" cy="441520"/>
+          </a:xfrm>
+        </p:spPr>
+        <p:txBody>
+          <a:bodyPr>
+            <a:noAutofit/>
+          </a:bodyPr>
+          <a:lstStyle/>
+          <a:p>
+            <a:r>
               <a:rPr lang="ru-RU" sz="2500" b="1" dirty="0">
                 <a:solidFill>
                   <a:srgbClr val="0230AC"/>
@@ -11991,7 +13569,7 @@
           <p:cNvPr id="2" name="Content Placeholder 2">
             <a:extLst>
               <a:ext uri="{FF2B5EF4-FFF2-40B4-BE49-F238E27FC236}">
-                <a16:creationId xmlns:a16="http://schemas.microsoft.com/office/drawing/2014/main" xmlns="" id="{53A38F7F-0C84-441F-A3C0-BC06B513898C}"/>
+                <a16:creationId xmlns="" xmlns:a16="http://schemas.microsoft.com/office/drawing/2014/main" id="{53A38F7F-0C84-441F-A3C0-BC06B513898C}"/>
               </a:ext>
             </a:extLst>
           </p:cNvPr>
@@ -12175,7 +13753,7 @@
                   <a:srgbClr val="000000"/>
                 </a:solidFill>
               </a:rPr>
-              <a:t>Симплекс-метод позволяет эффективно найти оптимальное решение, избегая простой перебор всех возможных угловых точек. Основной принцип метода: вычисления начинаются с какого-то «стартового» базисного решения, а затем </a:t>
+              <a:t>Симплекс-метод позволяет эффективно найти оптимальное решение, избегая </a:t>
             </a:r>
             <a:r>
               <a:rPr lang="ru-RU" sz="1900" dirty="0" smtClean="0">
@@ -12183,7 +13761,23 @@
                   <a:srgbClr val="000000"/>
                 </a:solidFill>
               </a:rPr>
-              <a:t>поиск </a:t>
+              <a:t>простого перебора </a:t>
+            </a:r>
+            <a:r>
+              <a:rPr lang="ru-RU" sz="1900" dirty="0">
+                <a:solidFill>
+                  <a:srgbClr val="000000"/>
+                </a:solidFill>
+              </a:rPr>
+              <a:t>всех возможных угловых точек. Основной принцип метода: вычисления начинаются с какого-то «стартового» базисного решения, а затем </a:t>
+            </a:r>
+            <a:r>
+              <a:rPr lang="ru-RU" sz="1900" dirty="0" smtClean="0">
+                <a:solidFill>
+                  <a:srgbClr val="000000"/>
+                </a:solidFill>
+              </a:rPr>
+              <a:t>происходит поиск </a:t>
             </a:r>
             <a:r>
               <a:rPr lang="ru-RU" sz="1900" dirty="0">

</xml_diff>